<commit_message>
Update assignments, reordered images in presentations
</commit_message>
<xml_diff>
--- a/Workshop/Opdrachten.pptx
+++ b/Workshop/Opdrachten.pptx
@@ -5,17 +5,21 @@
     <p:sldMasterId id="2147483648" r:id="rId4"/>
   </p:sldMasterIdLst>
   <p:notesMasterIdLst>
-    <p:notesMasterId r:id="rId8"/>
+    <p:notesMasterId r:id="rId12"/>
   </p:notesMasterIdLst>
   <p:handoutMasterIdLst>
-    <p:handoutMasterId r:id="rId9"/>
+    <p:handoutMasterId r:id="rId13"/>
   </p:handoutMasterIdLst>
   <p:sldIdLst>
     <p:sldId id="261" r:id="rId5"/>
     <p:sldId id="262" r:id="rId6"/>
-    <p:sldId id="263" r:id="rId7"/>
+    <p:sldId id="265" r:id="rId7"/>
+    <p:sldId id="263" r:id="rId8"/>
+    <p:sldId id="266" r:id="rId9"/>
+    <p:sldId id="264" r:id="rId10"/>
+    <p:sldId id="267" r:id="rId11"/>
   </p:sldIdLst>
-  <p:sldSz cx="9144000" cy="6858000" type="screen4x3"/>
+  <p:sldSz cx="12192000" cy="6858000"/>
   <p:notesSz cx="6858000" cy="9144000"/>
   <p:defaultTextStyle>
     <a:defPPr>
@@ -115,22 +119,22 @@
   <p:extLst>
     <p:ext uri="{EFAFB233-063F-42B5-8137-9DF3F51BA10A}">
       <p15:sldGuideLst xmlns:p15="http://schemas.microsoft.com/office/powerpoint/2012/main">
-        <p15:guide id="1" orient="horz" pos="3740">
+        <p15:guide id="1" orient="horz" pos="3740" userDrawn="1">
           <p15:clr>
             <a:srgbClr val="A4A3A4"/>
           </p15:clr>
         </p15:guide>
-        <p15:guide id="2" orient="horz" pos="298">
+        <p15:guide id="2" orient="horz" pos="298" userDrawn="1">
           <p15:clr>
             <a:srgbClr val="A4A3A4"/>
           </p15:clr>
         </p15:guide>
-        <p15:guide id="3" orient="horz" pos="881">
+        <p15:guide id="3" orient="horz" pos="881" userDrawn="1">
           <p15:clr>
             <a:srgbClr val="A4A3A4"/>
           </p15:clr>
         </p15:guide>
-        <p15:guide id="4" pos="389">
+        <p15:guide id="4" pos="519" userDrawn="1">
           <p15:clr>
             <a:srgbClr val="A4A3A4"/>
           </p15:clr>
@@ -223,7 +227,7 @@
           <a:p>
             <a:fld id="{4FDA5BBF-9A9E-E34C-87D2-CD6D1CA60245}" type="datetime1">
               <a:rPr lang="en-US" smtClean="0"/>
-              <a:t>9/13/2017</a:t>
+              <a:t>9/25/2017</a:t>
             </a:fld>
             <a:endParaRPr lang="en-US"/>
           </a:p>
@@ -389,7 +393,7 @@
           <a:p>
             <a:fld id="{FE5FB5CF-D153-1544-8329-2FC1F4ABF24D}" type="datetime1">
               <a:rPr lang="en-US" smtClean="0"/>
-              <a:t>9/13/2017</a:t>
+              <a:t>9/25/2017</a:t>
             </a:fld>
             <a:endParaRPr lang="nl-NL"/>
           </a:p>
@@ -407,8 +411,8 @@
         </p:nvSpPr>
         <p:spPr>
           <a:xfrm>
-            <a:off x="1143000" y="685800"/>
-            <a:ext cx="4572000" cy="3429000"/>
+            <a:off x="381000" y="685800"/>
+            <a:ext cx="6096000" cy="3429000"/>
           </a:xfrm>
           <a:prstGeom prst="rect">
             <a:avLst/>
@@ -685,7 +689,12 @@
             <p:ph type="sldImg"/>
           </p:nvPr>
         </p:nvSpPr>
-        <p:spPr/>
+        <p:spPr>
+          <a:xfrm>
+            <a:off x="381000" y="685800"/>
+            <a:ext cx="6096000" cy="3429000"/>
+          </a:xfrm>
+        </p:spPr>
       </p:sp>
       <p:sp>
         <p:nvSpPr>
@@ -782,7 +791,7 @@
         <p:spPr>
           <a:xfrm>
             <a:off x="0" y="0"/>
-            <a:ext cx="9144000" cy="6858000"/>
+            <a:ext cx="12192000" cy="6858000"/>
           </a:xfrm>
           <a:prstGeom prst="rect">
             <a:avLst/>
@@ -801,8 +810,8 @@
         </p:nvSpPr>
         <p:spPr>
           <a:xfrm>
-            <a:off x="611560" y="648969"/>
-            <a:ext cx="7772400" cy="1470025"/>
+            <a:off x="815413" y="648970"/>
+            <a:ext cx="10363200" cy="1470025"/>
           </a:xfrm>
         </p:spPr>
         <p:txBody>
@@ -840,8 +849,8 @@
         </p:nvSpPr>
         <p:spPr>
           <a:xfrm>
-            <a:off x="634402" y="5849141"/>
-            <a:ext cx="2133424" cy="467568"/>
+            <a:off x="845870" y="5849141"/>
+            <a:ext cx="2844565" cy="467568"/>
           </a:xfrm>
         </p:spPr>
         <p:txBody>
@@ -876,8 +885,8 @@
         </p:nvSpPr>
         <p:spPr>
           <a:xfrm>
-            <a:off x="634402" y="6341926"/>
-            <a:ext cx="2133600" cy="210972"/>
+            <a:off x="845869" y="6341926"/>
+            <a:ext cx="2844800" cy="210972"/>
           </a:xfrm>
         </p:spPr>
         <p:txBody>
@@ -894,7 +903,7 @@
           <a:p>
             <a:fld id="{B3EFC8CF-4518-483E-BF81-82F49AAE742C}" type="datetime4">
               <a:rPr lang="en-US" smtClean="0"/>
-              <a:t>September 13, 2017</a:t>
+              <a:t>September 25, 2017</a:t>
             </a:fld>
             <a:endParaRPr lang="nl-NL" dirty="0"/>
           </a:p>
@@ -972,8 +981,8 @@
         </p:nvSpPr>
         <p:spPr>
           <a:xfrm>
-            <a:off x="620612" y="1398589"/>
-            <a:ext cx="8162871" cy="2318444"/>
+            <a:off x="827483" y="1398589"/>
+            <a:ext cx="10883828" cy="2318444"/>
           </a:xfrm>
         </p:spPr>
         <p:txBody>
@@ -1019,7 +1028,7 @@
           <a:p>
             <a:fld id="{D2C2CA4E-12C0-48C6-9B7C-10AB48AF096F}" type="datetime4">
               <a:rPr lang="en-US" smtClean="0"/>
-              <a:t>September 13, 2017</a:t>
+              <a:t>September 25, 2017</a:t>
             </a:fld>
             <a:endParaRPr lang="nl-NL" dirty="0"/>
           </a:p>
@@ -1037,8 +1046,8 @@
         </p:nvSpPr>
         <p:spPr>
           <a:xfrm>
-            <a:off x="640800" y="6263119"/>
-            <a:ext cx="2632364" cy="365125"/>
+            <a:off x="854400" y="6263120"/>
+            <a:ext cx="3509819" cy="365125"/>
           </a:xfrm>
         </p:spPr>
         <p:txBody>
@@ -1073,8 +1082,8 @@
         </p:nvSpPr>
         <p:spPr>
           <a:xfrm>
-            <a:off x="0" y="3861048"/>
-            <a:ext cx="3051383" cy="2186952"/>
+            <a:off x="1" y="3861048"/>
+            <a:ext cx="4068511" cy="2186952"/>
           </a:xfrm>
         </p:spPr>
         <p:txBody>
@@ -1108,8 +1117,8 @@
         </p:nvSpPr>
         <p:spPr>
           <a:xfrm>
-            <a:off x="3046308" y="3861048"/>
-            <a:ext cx="3051383" cy="2186952"/>
+            <a:off x="4061745" y="3861048"/>
+            <a:ext cx="4068511" cy="2186952"/>
           </a:xfrm>
         </p:spPr>
         <p:txBody>
@@ -1143,8 +1152,8 @@
         </p:nvSpPr>
         <p:spPr>
           <a:xfrm>
-            <a:off x="6092617" y="3861048"/>
-            <a:ext cx="3051383" cy="2186952"/>
+            <a:off x="8123490" y="3861048"/>
+            <a:ext cx="4068511" cy="2186952"/>
           </a:xfrm>
         </p:spPr>
         <p:txBody>
@@ -1215,8 +1224,8 @@
         </p:nvSpPr>
         <p:spPr>
           <a:xfrm>
-            <a:off x="620612" y="473075"/>
-            <a:ext cx="8130097" cy="3243957"/>
+            <a:off x="827484" y="473076"/>
+            <a:ext cx="10840129" cy="3243957"/>
           </a:xfrm>
         </p:spPr>
         <p:txBody>
@@ -1262,7 +1271,7 @@
           <a:p>
             <a:fld id="{1C637C43-8D60-4091-8099-68069052AA82}" type="datetime4">
               <a:rPr lang="en-US" smtClean="0"/>
-              <a:t>September 13, 2017</a:t>
+              <a:t>September 25, 2017</a:t>
             </a:fld>
             <a:endParaRPr lang="nl-NL" dirty="0"/>
           </a:p>
@@ -1280,8 +1289,8 @@
         </p:nvSpPr>
         <p:spPr>
           <a:xfrm>
-            <a:off x="640800" y="6263119"/>
-            <a:ext cx="2632364" cy="365125"/>
+            <a:off x="854400" y="6263120"/>
+            <a:ext cx="3509819" cy="365125"/>
           </a:xfrm>
         </p:spPr>
         <p:txBody>
@@ -1316,8 +1325,8 @@
         </p:nvSpPr>
         <p:spPr>
           <a:xfrm>
-            <a:off x="0" y="3861048"/>
-            <a:ext cx="3051383" cy="2186952"/>
+            <a:off x="1" y="3861048"/>
+            <a:ext cx="4068511" cy="2186952"/>
           </a:xfrm>
         </p:spPr>
         <p:txBody>
@@ -1351,8 +1360,8 @@
         </p:nvSpPr>
         <p:spPr>
           <a:xfrm>
-            <a:off x="3046308" y="3861048"/>
-            <a:ext cx="3051383" cy="2186952"/>
+            <a:off x="4061745" y="3861048"/>
+            <a:ext cx="4068511" cy="2186952"/>
           </a:xfrm>
         </p:spPr>
         <p:txBody>
@@ -1386,8 +1395,8 @@
         </p:nvSpPr>
         <p:spPr>
           <a:xfrm>
-            <a:off x="6092617" y="3861048"/>
-            <a:ext cx="3051383" cy="2186952"/>
+            <a:off x="8123490" y="3861048"/>
+            <a:ext cx="4068511" cy="2186952"/>
           </a:xfrm>
         </p:spPr>
         <p:txBody>
@@ -1429,6 +1438,132 @@
 </p:sldLayout>
 </file>
 
+<file path=ppt/slideLayouts/slideLayout12.xml><?xml version="1.0" encoding="utf-8"?>
+<p:sldLayout xmlns:a="http://schemas.openxmlformats.org/drawingml/2006/main" xmlns:r="http://schemas.openxmlformats.org/officeDocument/2006/relationships" xmlns:p="http://schemas.openxmlformats.org/presentationml/2006/main" type="titleOnly">
+  <p:cSld name="Title Only">
+    <p:spTree>
+      <p:nvGrpSpPr>
+        <p:cNvPr id="1" name=""/>
+        <p:cNvGrpSpPr/>
+        <p:nvPr/>
+      </p:nvGrpSpPr>
+      <p:grpSpPr>
+        <a:xfrm>
+          <a:off x="0" y="0"/>
+          <a:ext cx="0" cy="0"/>
+          <a:chOff x="0" y="0"/>
+          <a:chExt cx="0" cy="0"/>
+        </a:xfrm>
+      </p:grpSpPr>
+      <p:sp>
+        <p:nvSpPr>
+          <p:cNvPr id="2" name="Title 1"/>
+          <p:cNvSpPr>
+            <a:spLocks noGrp="1"/>
+          </p:cNvSpPr>
+          <p:nvPr>
+            <p:ph type="title"/>
+          </p:nvPr>
+        </p:nvSpPr>
+        <p:spPr/>
+        <p:txBody>
+          <a:bodyPr/>
+          <a:lstStyle/>
+          <a:p>
+            <a:r>
+              <a:rPr lang="en-US" smtClean="0"/>
+              <a:t>Click to edit Master title style</a:t>
+            </a:r>
+            <a:endParaRPr lang="nl-NL"/>
+          </a:p>
+        </p:txBody>
+      </p:sp>
+      <p:sp>
+        <p:nvSpPr>
+          <p:cNvPr id="3" name="Date Placeholder 2"/>
+          <p:cNvSpPr>
+            <a:spLocks noGrp="1"/>
+          </p:cNvSpPr>
+          <p:nvPr>
+            <p:ph type="dt" sz="half" idx="10"/>
+          </p:nvPr>
+        </p:nvSpPr>
+        <p:spPr/>
+        <p:txBody>
+          <a:bodyPr/>
+          <a:lstStyle/>
+          <a:p>
+            <a:fld id="{E78D6EB9-4637-4CE3-BF61-F6FF621A0402}" type="datetimeFigureOut">
+              <a:rPr lang="nl-NL" smtClean="0"/>
+              <a:t>25-9-2017</a:t>
+            </a:fld>
+            <a:endParaRPr lang="nl-NL"/>
+          </a:p>
+        </p:txBody>
+      </p:sp>
+      <p:sp>
+        <p:nvSpPr>
+          <p:cNvPr id="4" name="Footer Placeholder 3"/>
+          <p:cNvSpPr>
+            <a:spLocks noGrp="1"/>
+          </p:cNvSpPr>
+          <p:nvPr>
+            <p:ph type="ftr" sz="quarter" idx="11"/>
+          </p:nvPr>
+        </p:nvSpPr>
+        <p:spPr/>
+        <p:txBody>
+          <a:bodyPr/>
+          <a:lstStyle/>
+          <a:p>
+            <a:endParaRPr lang="nl-NL"/>
+          </a:p>
+        </p:txBody>
+      </p:sp>
+      <p:sp>
+        <p:nvSpPr>
+          <p:cNvPr id="5" name="Slide Number Placeholder 4"/>
+          <p:cNvSpPr>
+            <a:spLocks noGrp="1"/>
+          </p:cNvSpPr>
+          <p:nvPr>
+            <p:ph type="sldNum" sz="quarter" idx="12"/>
+          </p:nvPr>
+        </p:nvSpPr>
+        <p:spPr>
+          <a:xfrm>
+            <a:off x="8610600" y="6356352"/>
+            <a:ext cx="2743200" cy="365125"/>
+          </a:xfrm>
+          <a:prstGeom prst="rect">
+            <a:avLst/>
+          </a:prstGeom>
+        </p:spPr>
+        <p:txBody>
+          <a:bodyPr/>
+          <a:lstStyle/>
+          <a:p>
+            <a:fld id="{FB92283B-BB50-4A5A-AB46-952FE70324DE}" type="slidenum">
+              <a:rPr lang="nl-NL" smtClean="0"/>
+              <a:t>‹#›</a:t>
+            </a:fld>
+            <a:endParaRPr lang="nl-NL"/>
+          </a:p>
+        </p:txBody>
+      </p:sp>
+    </p:spTree>
+    <p:extLst>
+      <p:ext uri="{BB962C8B-B14F-4D97-AF65-F5344CB8AC3E}">
+        <p14:creationId xmlns:p14="http://schemas.microsoft.com/office/powerpoint/2010/main" val="3710592643"/>
+      </p:ext>
+    </p:extLst>
+  </p:cSld>
+  <p:clrMapOvr>
+    <a:masterClrMapping/>
+  </p:clrMapOvr>
+</p:sldLayout>
+</file>
+
 <file path=ppt/slideLayouts/slideLayout2.xml><?xml version="1.0" encoding="utf-8"?>
 <p:sldLayout xmlns:a="http://schemas.openxmlformats.org/drawingml/2006/main" xmlns:r="http://schemas.openxmlformats.org/officeDocument/2006/relationships" xmlns:p="http://schemas.openxmlformats.org/presentationml/2006/main" preserve="1" userDrawn="1">
   <p:cSld name="Titel en object">
@@ -1546,7 +1681,7 @@
           <a:p>
             <a:fld id="{AC3724A0-D062-4236-A510-F790F3437765}" type="datetime4">
               <a:rPr lang="en-US" smtClean="0"/>
-              <a:t>September 13, 2017</a:t>
+              <a:t>September 25, 2017</a:t>
             </a:fld>
             <a:endParaRPr lang="nl-NL" dirty="0"/>
           </a:p>
@@ -1564,8 +1699,8 @@
         </p:nvSpPr>
         <p:spPr>
           <a:xfrm>
-            <a:off x="640800" y="6263119"/>
-            <a:ext cx="2632364" cy="365125"/>
+            <a:off x="854400" y="6263120"/>
+            <a:ext cx="3509819" cy="365125"/>
           </a:xfrm>
         </p:spPr>
         <p:txBody>
@@ -1650,7 +1785,7 @@
           <a:p>
             <a:fld id="{E29DC6FA-E074-461E-85C1-5F37BBB11875}" type="datetime4">
               <a:rPr lang="en-US" smtClean="0"/>
-              <a:t>September 13, 2017</a:t>
+              <a:t>September 25, 2017</a:t>
             </a:fld>
             <a:endParaRPr lang="nl-NL" dirty="0"/>
           </a:p>
@@ -1700,7 +1835,7 @@
         <p:spPr>
           <a:xfrm>
             <a:off x="0" y="0"/>
-            <a:ext cx="9144000" cy="6048000"/>
+            <a:ext cx="12192000" cy="6048000"/>
           </a:xfrm>
         </p:spPr>
         <p:txBody>
@@ -1771,8 +1906,8 @@
         </p:nvSpPr>
         <p:spPr>
           <a:xfrm>
-            <a:off x="4810872" y="473075"/>
-            <a:ext cx="3937592" cy="697783"/>
+            <a:off x="6414496" y="473076"/>
+            <a:ext cx="5250123" cy="697783"/>
           </a:xfrm>
         </p:spPr>
         <p:txBody>
@@ -1806,8 +1941,8 @@
         </p:nvSpPr>
         <p:spPr>
           <a:xfrm>
-            <a:off x="4810872" y="1242865"/>
-            <a:ext cx="3937592" cy="4694385"/>
+            <a:off x="6414496" y="1242866"/>
+            <a:ext cx="5250123" cy="4694385"/>
           </a:xfrm>
         </p:spPr>
         <p:txBody>
@@ -1873,7 +2008,7 @@
           <a:p>
             <a:fld id="{86625BD9-217D-4A1B-8BA6-D64A6347B4DD}" type="datetime4">
               <a:rPr lang="en-US" smtClean="0"/>
-              <a:t>September 13, 2017</a:t>
+              <a:t>September 25, 2017</a:t>
             </a:fld>
             <a:endParaRPr lang="nl-NL" dirty="0"/>
           </a:p>
@@ -1891,8 +2026,8 @@
         </p:nvSpPr>
         <p:spPr>
           <a:xfrm>
-            <a:off x="640800" y="6263119"/>
-            <a:ext cx="2632364" cy="365125"/>
+            <a:off x="854400" y="6263120"/>
+            <a:ext cx="3509819" cy="365125"/>
           </a:xfrm>
         </p:spPr>
         <p:txBody>
@@ -1928,7 +2063,7 @@
         <p:spPr>
           <a:xfrm>
             <a:off x="0" y="0"/>
-            <a:ext cx="4572000" cy="6048000"/>
+            <a:ext cx="6096000" cy="6048000"/>
           </a:xfrm>
         </p:spPr>
         <p:txBody>
@@ -1999,8 +2134,8 @@
         </p:nvSpPr>
         <p:spPr>
           <a:xfrm>
-            <a:off x="4810872" y="473075"/>
-            <a:ext cx="3937592" cy="5464175"/>
+            <a:off x="6414496" y="473076"/>
+            <a:ext cx="5250123" cy="5464175"/>
           </a:xfrm>
         </p:spPr>
         <p:txBody>
@@ -2066,7 +2201,7 @@
           <a:p>
             <a:fld id="{634FBCD8-0F6E-4656-AAAE-25D9EFE02704}" type="datetime4">
               <a:rPr lang="en-US" smtClean="0"/>
-              <a:t>September 13, 2017</a:t>
+              <a:t>September 25, 2017</a:t>
             </a:fld>
             <a:endParaRPr lang="nl-NL" dirty="0"/>
           </a:p>
@@ -2084,8 +2219,8 @@
         </p:nvSpPr>
         <p:spPr>
           <a:xfrm>
-            <a:off x="640800" y="6263119"/>
-            <a:ext cx="2632364" cy="365125"/>
+            <a:off x="854400" y="6263120"/>
+            <a:ext cx="3509819" cy="365125"/>
           </a:xfrm>
         </p:spPr>
         <p:txBody>
@@ -2121,7 +2256,7 @@
         <p:spPr>
           <a:xfrm>
             <a:off x="0" y="0"/>
-            <a:ext cx="4572000" cy="6048000"/>
+            <a:ext cx="6096000" cy="6048000"/>
           </a:xfrm>
         </p:spPr>
         <p:txBody>
@@ -2192,8 +2327,8 @@
         </p:nvSpPr>
         <p:spPr>
           <a:xfrm>
-            <a:off x="4810872" y="473075"/>
-            <a:ext cx="3937592" cy="697783"/>
+            <a:off x="6414496" y="473076"/>
+            <a:ext cx="5250123" cy="697783"/>
           </a:xfrm>
         </p:spPr>
         <p:txBody>
@@ -2227,8 +2362,8 @@
         </p:nvSpPr>
         <p:spPr>
           <a:xfrm>
-            <a:off x="4810872" y="1242865"/>
-            <a:ext cx="3937592" cy="4694385"/>
+            <a:off x="6414496" y="1242866"/>
+            <a:ext cx="5250123" cy="4694385"/>
           </a:xfrm>
         </p:spPr>
         <p:txBody>
@@ -2294,7 +2429,7 @@
           <a:p>
             <a:fld id="{F380C43D-B778-4E6E-9DE4-2562B282C36C}" type="datetime4">
               <a:rPr lang="en-US" smtClean="0"/>
-              <a:t>September 13, 2017</a:t>
+              <a:t>September 25, 2017</a:t>
             </a:fld>
             <a:endParaRPr lang="nl-NL" dirty="0"/>
           </a:p>
@@ -2312,8 +2447,8 @@
         </p:nvSpPr>
         <p:spPr>
           <a:xfrm>
-            <a:off x="640800" y="6263119"/>
-            <a:ext cx="2632364" cy="365125"/>
+            <a:off x="854400" y="6263120"/>
+            <a:ext cx="3509819" cy="365125"/>
           </a:xfrm>
         </p:spPr>
         <p:txBody>
@@ -2349,7 +2484,7 @@
         <p:spPr>
           <a:xfrm>
             <a:off x="0" y="0"/>
-            <a:ext cx="4572000" cy="3024000"/>
+            <a:ext cx="6096000" cy="3024000"/>
           </a:xfrm>
         </p:spPr>
         <p:txBody>
@@ -2384,7 +2519,7 @@
         <p:spPr>
           <a:xfrm>
             <a:off x="0" y="3024000"/>
-            <a:ext cx="4572000" cy="3024000"/>
+            <a:ext cx="6096000" cy="3024000"/>
           </a:xfrm>
         </p:spPr>
         <p:txBody>
@@ -2455,8 +2590,8 @@
         </p:nvSpPr>
         <p:spPr>
           <a:xfrm>
-            <a:off x="4810872" y="473075"/>
-            <a:ext cx="3937592" cy="5464175"/>
+            <a:off x="6414496" y="473076"/>
+            <a:ext cx="5250123" cy="5464175"/>
           </a:xfrm>
         </p:spPr>
         <p:txBody>
@@ -2531,7 +2666,7 @@
             <a:fld id="{F84BD9F4-73FB-4C4F-A1B9-CDB31947F036}" type="datetime4">
               <a:rPr lang="en-US" smtClean="0"/>
               <a:pPr/>
-              <a:t>September 13, 2017</a:t>
+              <a:t>September 25, 2017</a:t>
             </a:fld>
             <a:endParaRPr lang="nl-NL" dirty="0"/>
           </a:p>
@@ -2549,8 +2684,8 @@
         </p:nvSpPr>
         <p:spPr>
           <a:xfrm>
-            <a:off x="640800" y="6263119"/>
-            <a:ext cx="2632364" cy="365125"/>
+            <a:off x="854400" y="6263120"/>
+            <a:ext cx="3509819" cy="365125"/>
           </a:xfrm>
         </p:spPr>
         <p:txBody>
@@ -2586,7 +2721,7 @@
         <p:spPr>
           <a:xfrm>
             <a:off x="0" y="0"/>
-            <a:ext cx="4572000" cy="3024000"/>
+            <a:ext cx="6096000" cy="3024000"/>
           </a:xfrm>
         </p:spPr>
         <p:txBody>
@@ -2621,7 +2756,7 @@
         <p:spPr>
           <a:xfrm>
             <a:off x="0" y="3024000"/>
-            <a:ext cx="4572000" cy="3024000"/>
+            <a:ext cx="6096000" cy="3024000"/>
           </a:xfrm>
         </p:spPr>
         <p:txBody>
@@ -2715,8 +2850,8 @@
         </p:nvSpPr>
         <p:spPr>
           <a:xfrm>
-            <a:off x="620612" y="1398589"/>
-            <a:ext cx="8154677" cy="1454348"/>
+            <a:off x="827483" y="1398589"/>
+            <a:ext cx="10872903" cy="1454348"/>
           </a:xfrm>
         </p:spPr>
         <p:txBody>
@@ -2762,7 +2897,7 @@
           <a:p>
             <a:fld id="{3556AA12-2DBB-44C0-A320-8645F501DBD9}" type="datetime4">
               <a:rPr lang="en-US" smtClean="0"/>
-              <a:t>September 13, 2017</a:t>
+              <a:t>September 25, 2017</a:t>
             </a:fld>
             <a:endParaRPr lang="nl-NL" dirty="0"/>
           </a:p>
@@ -2780,8 +2915,8 @@
         </p:nvSpPr>
         <p:spPr>
           <a:xfrm>
-            <a:off x="640800" y="6263119"/>
-            <a:ext cx="2632364" cy="365125"/>
+            <a:off x="854400" y="6263120"/>
+            <a:ext cx="3509819" cy="365125"/>
           </a:xfrm>
         </p:spPr>
         <p:txBody>
@@ -2817,7 +2952,7 @@
         <p:spPr>
           <a:xfrm>
             <a:off x="0" y="3024000"/>
-            <a:ext cx="4572000" cy="3024000"/>
+            <a:ext cx="6096000" cy="3024000"/>
           </a:xfrm>
         </p:spPr>
         <p:txBody>
@@ -2851,8 +2986,8 @@
         </p:nvSpPr>
         <p:spPr>
           <a:xfrm>
-            <a:off x="4572000" y="3024000"/>
-            <a:ext cx="4572000" cy="3024000"/>
+            <a:off x="6096000" y="3024000"/>
+            <a:ext cx="6096000" cy="3024000"/>
           </a:xfrm>
         </p:spPr>
         <p:txBody>
@@ -2923,8 +3058,8 @@
         </p:nvSpPr>
         <p:spPr>
           <a:xfrm>
-            <a:off x="620613" y="473075"/>
-            <a:ext cx="8075240" cy="2379861"/>
+            <a:off x="827484" y="473076"/>
+            <a:ext cx="10766987" cy="2379861"/>
           </a:xfrm>
         </p:spPr>
         <p:txBody>
@@ -2970,7 +3105,7 @@
           <a:p>
             <a:fld id="{BFD2C47E-82EB-4D17-B857-A82BDEEA48CB}" type="datetime4">
               <a:rPr lang="en-US" smtClean="0"/>
-              <a:t>September 13, 2017</a:t>
+              <a:t>September 25, 2017</a:t>
             </a:fld>
             <a:endParaRPr lang="nl-NL" dirty="0"/>
           </a:p>
@@ -2988,8 +3123,8 @@
         </p:nvSpPr>
         <p:spPr>
           <a:xfrm>
-            <a:off x="640800" y="6263119"/>
-            <a:ext cx="2632364" cy="365125"/>
+            <a:off x="854400" y="6263120"/>
+            <a:ext cx="3509819" cy="365125"/>
           </a:xfrm>
         </p:spPr>
         <p:txBody>
@@ -3025,7 +3160,7 @@
         <p:spPr>
           <a:xfrm>
             <a:off x="0" y="3024000"/>
-            <a:ext cx="4572000" cy="3024000"/>
+            <a:ext cx="6096000" cy="3024000"/>
           </a:xfrm>
         </p:spPr>
         <p:txBody>
@@ -3059,8 +3194,8 @@
         </p:nvSpPr>
         <p:spPr>
           <a:xfrm>
-            <a:off x="4572000" y="3024000"/>
-            <a:ext cx="4572000" cy="3024000"/>
+            <a:off x="6096000" y="3024000"/>
+            <a:ext cx="6096000" cy="3024000"/>
           </a:xfrm>
         </p:spPr>
         <p:txBody>
@@ -3133,7 +3268,7 @@
           <p:nvPr userDrawn="1"/>
         </p:nvPicPr>
         <p:blipFill>
-          <a:blip r:embed="rId13">
+          <a:blip r:embed="rId14">
             <a:extLst>
               <a:ext uri="{28A0092B-C50C-407E-A947-70E740481C1C}">
                 <a14:useLocalDpi xmlns:a14="http://schemas.microsoft.com/office/drawing/2010/main" val="0"/>
@@ -3147,7 +3282,7 @@
         <p:spPr>
           <a:xfrm>
             <a:off x="0" y="6070196"/>
-            <a:ext cx="9144000" cy="787804"/>
+            <a:ext cx="12192000" cy="787804"/>
           </a:xfrm>
           <a:prstGeom prst="rect">
             <a:avLst/>
@@ -3166,8 +3301,8 @@
         </p:nvSpPr>
         <p:spPr>
           <a:xfrm>
-            <a:off x="3402710" y="6263119"/>
-            <a:ext cx="2133600" cy="365125"/>
+            <a:off x="4536947" y="6263120"/>
+            <a:ext cx="2844800" cy="365125"/>
           </a:xfrm>
           <a:prstGeom prst="rect">
             <a:avLst/>
@@ -3193,7 +3328,7 @@
                   <a:schemeClr val="tx2"/>
                 </a:solidFill>
               </a:rPr>
-              <a:t>September 13, 2017</a:t>
+              <a:t>September 25, 2017</a:t>
             </a:fld>
             <a:r>
               <a:rPr lang="en-US" smtClean="0"/>
@@ -3215,8 +3350,8 @@
         </p:nvSpPr>
         <p:spPr>
           <a:xfrm>
-            <a:off x="617538" y="473075"/>
-            <a:ext cx="8163164" cy="822443"/>
+            <a:off x="823384" y="473075"/>
+            <a:ext cx="10884219" cy="822443"/>
           </a:xfrm>
           <a:prstGeom prst="rect">
             <a:avLst/>
@@ -3248,8 +3383,8 @@
         </p:nvSpPr>
         <p:spPr>
           <a:xfrm>
-            <a:off x="617538" y="1409495"/>
-            <a:ext cx="8163164" cy="4530827"/>
+            <a:off x="823384" y="1409496"/>
+            <a:ext cx="10884219" cy="4530827"/>
           </a:xfrm>
           <a:prstGeom prst="rect">
             <a:avLst/>
@@ -3310,8 +3445,8 @@
         </p:nvSpPr>
         <p:spPr>
           <a:xfrm>
-            <a:off x="639766" y="6263119"/>
-            <a:ext cx="2632364" cy="365125"/>
+            <a:off x="853021" y="6263120"/>
+            <a:ext cx="3509819" cy="365125"/>
           </a:xfrm>
           <a:prstGeom prst="rect">
             <a:avLst/>
@@ -3359,6 +3494,7 @@
     <p:sldLayoutId id="2147483665" r:id="rId9"/>
     <p:sldLayoutId id="2147483669" r:id="rId10"/>
     <p:sldLayoutId id="2147483670" r:id="rId11"/>
+    <p:sldLayoutId id="2147483671" r:id="rId12"/>
   </p:sldLayoutIdLst>
   <p:timing>
     <p:tnLst>
@@ -3718,7 +3854,7 @@
           <a:p>
             <a:fld id="{38025CAD-33AB-4F12-B028-4B342C966897}" type="datetime4">
               <a:rPr lang="en-US" smtClean="0"/>
-              <a:t>September 13, 2017</a:t>
+              <a:t>September 25, 2017</a:t>
             </a:fld>
             <a:endParaRPr lang="nl-NL" dirty="0"/>
           </a:p>
@@ -3777,24 +3913,16 @@
           <a:lstStyle/>
           <a:p>
             <a:r>
-              <a:rPr lang="en-US" dirty="0" err="1" smtClean="0"/>
-              <a:t>Opdracht</a:t>
-            </a:r>
-            <a:r>
               <a:rPr lang="en-US" dirty="0" smtClean="0"/>
-              <a:t> 1: </a:t>
-            </a:r>
-            <a:r>
-              <a:rPr lang="en-US" dirty="0" err="1" smtClean="0"/>
-              <a:t>Een</a:t>
+              <a:t>Assignment 1</a:t>
             </a:r>
             <a:r>
               <a:rPr lang="en-US" dirty="0" smtClean="0"/>
-              <a:t> container </a:t>
-            </a:r>
-            <a:r>
-              <a:rPr lang="en-US" dirty="0" err="1" smtClean="0"/>
-              <a:t>lokaal</a:t>
+              <a:t>: </a:t>
+            </a:r>
+            <a:r>
+              <a:rPr lang="en-US" dirty="0" smtClean="0"/>
+              <a:t>one container running locally</a:t>
             </a:r>
             <a:endParaRPr lang="nl-NL" dirty="0"/>
           </a:p>
@@ -3816,12 +3944,12 @@
           <a:lstStyle/>
           <a:p>
             <a:r>
-              <a:rPr lang="en-US" dirty="0" err="1" smtClean="0"/>
-              <a:t>Zie</a:t>
-            </a:r>
-            <a:r>
               <a:rPr lang="en-US" dirty="0" smtClean="0"/>
-              <a:t> de Docker 101</a:t>
+              <a:t>See </a:t>
+            </a:r>
+            <a:r>
+              <a:rPr lang="en-US" dirty="0" smtClean="0"/>
+              <a:t>Docker 101</a:t>
             </a:r>
             <a:endParaRPr lang="nl-NL" dirty="0"/>
           </a:p>
@@ -3844,7 +3972,7 @@
           <a:p>
             <a:fld id="{AC3724A0-D062-4236-A510-F790F3437765}" type="datetime4">
               <a:rPr lang="en-US" smtClean="0"/>
-              <a:t>September 13, 2017</a:t>
+              <a:t>September 25, 2017</a:t>
             </a:fld>
             <a:endParaRPr lang="nl-NL" dirty="0"/>
           </a:p>
@@ -3912,7 +4040,7 @@
       </p:grpSpPr>
       <p:sp>
         <p:nvSpPr>
-          <p:cNvPr id="2" name="Title 1"/>
+          <p:cNvPr id="4" name="Title 3"/>
           <p:cNvSpPr>
             <a:spLocks noGrp="1"/>
           </p:cNvSpPr>
@@ -3926,12 +4054,16 @@
           <a:lstStyle/>
           <a:p>
             <a:r>
-              <a:rPr lang="en-US" dirty="0" err="1" smtClean="0"/>
-              <a:t>Opdracht</a:t>
-            </a:r>
-            <a:r>
-              <a:rPr lang="en-US" dirty="0" smtClean="0"/>
-              <a:t> 2: 2 containers met OSS</a:t>
+              <a:rPr lang="nl-NL" dirty="0" smtClean="0"/>
+              <a:t>Infrastructuur </a:t>
+            </a:r>
+            <a:r>
+              <a:rPr lang="nl-NL" dirty="0" err="1" smtClean="0"/>
+              <a:t>staticws</a:t>
+            </a:r>
+            <a:r>
+              <a:rPr lang="nl-NL" dirty="0" smtClean="0"/>
+              <a:t>-opdracht</a:t>
             </a:r>
             <a:endParaRPr lang="nl-NL" dirty="0"/>
           </a:p>
@@ -3939,12 +4071,295 @@
       </p:sp>
       <p:sp>
         <p:nvSpPr>
-          <p:cNvPr id="3" name="Content Placeholder 2"/>
-          <p:cNvSpPr>
-            <a:spLocks noGrp="1"/>
-          </p:cNvSpPr>
-          <p:nvPr>
-            <p:ph idx="1"/>
+          <p:cNvPr id="9" name="Smiley Face 8"/>
+          <p:cNvSpPr/>
+          <p:nvPr/>
+        </p:nvSpPr>
+        <p:spPr>
+          <a:xfrm>
+            <a:off x="2916686" y="1624055"/>
+            <a:ext cx="941832" cy="877824"/>
+          </a:xfrm>
+          <a:prstGeom prst="smileyFace">
+            <a:avLst/>
+          </a:prstGeom>
+          <a:gradFill>
+            <a:gsLst>
+              <a:gs pos="0">
+                <a:schemeClr val="accent1">
+                  <a:lumMod val="5000"/>
+                  <a:lumOff val="95000"/>
+                </a:schemeClr>
+              </a:gs>
+              <a:gs pos="74000">
+                <a:schemeClr val="accent1">
+                  <a:lumMod val="45000"/>
+                  <a:lumOff val="55000"/>
+                </a:schemeClr>
+              </a:gs>
+              <a:gs pos="83000">
+                <a:schemeClr val="accent1">
+                  <a:lumMod val="45000"/>
+                  <a:lumOff val="55000"/>
+                </a:schemeClr>
+              </a:gs>
+              <a:gs pos="100000">
+                <a:schemeClr val="accent1">
+                  <a:lumMod val="30000"/>
+                  <a:lumOff val="70000"/>
+                </a:schemeClr>
+              </a:gs>
+            </a:gsLst>
+            <a:lin ang="5400000" scaled="1"/>
+          </a:gradFill>
+        </p:spPr>
+        <p:style>
+          <a:lnRef idx="2">
+            <a:schemeClr val="accent1">
+              <a:shade val="50000"/>
+            </a:schemeClr>
+          </a:lnRef>
+          <a:fillRef idx="1">
+            <a:schemeClr val="accent1"/>
+          </a:fillRef>
+          <a:effectRef idx="0">
+            <a:schemeClr val="accent1"/>
+          </a:effectRef>
+          <a:fontRef idx="minor">
+            <a:schemeClr val="lt1"/>
+          </a:fontRef>
+        </p:style>
+        <p:txBody>
+          <a:bodyPr rtlCol="0" anchor="ctr"/>
+          <a:lstStyle/>
+          <a:p>
+            <a:pPr algn="ctr"/>
+            <a:endParaRPr lang="nl-NL"/>
+          </a:p>
+        </p:txBody>
+      </p:sp>
+      <p:pic>
+        <p:nvPicPr>
+          <p:cNvPr id="12" name="Picture 11"/>
+          <p:cNvPicPr>
+            <a:picLocks noChangeAspect="1"/>
+          </p:cNvPicPr>
+          <p:nvPr/>
+        </p:nvPicPr>
+        <p:blipFill>
+          <a:blip r:embed="rId2">
+            <a:extLst>
+              <a:ext uri="{28A0092B-C50C-407E-A947-70E740481C1C}">
+                <a14:useLocalDpi xmlns:a14="http://schemas.microsoft.com/office/drawing/2010/main" val="0"/>
+              </a:ext>
+            </a:extLst>
+          </a:blip>
+          <a:stretch>
+            <a:fillRect/>
+          </a:stretch>
+        </p:blipFill>
+        <p:spPr>
+          <a:xfrm>
+            <a:off x="2506790" y="2752059"/>
+            <a:ext cx="2606184" cy="1744190"/>
+          </a:xfrm>
+          <a:prstGeom prst="rect">
+            <a:avLst/>
+          </a:prstGeom>
+          <a:ln w="19050">
+            <a:solidFill>
+              <a:schemeClr val="accent1">
+                <a:shade val="50000"/>
+              </a:schemeClr>
+            </a:solidFill>
+          </a:ln>
+        </p:spPr>
+      </p:pic>
+      <p:sp>
+        <p:nvSpPr>
+          <p:cNvPr id="13" name="Rectangle 12"/>
+          <p:cNvSpPr/>
+          <p:nvPr/>
+        </p:nvSpPr>
+        <p:spPr>
+          <a:xfrm>
+            <a:off x="7270788" y="2236498"/>
+            <a:ext cx="2042809" cy="2752928"/>
+          </a:xfrm>
+          <a:prstGeom prst="rect">
+            <a:avLst/>
+          </a:prstGeom>
+        </p:spPr>
+        <p:style>
+          <a:lnRef idx="2">
+            <a:schemeClr val="accent1">
+              <a:shade val="50000"/>
+            </a:schemeClr>
+          </a:lnRef>
+          <a:fillRef idx="1001">
+            <a:schemeClr val="dk2"/>
+          </a:fillRef>
+          <a:effectRef idx="0">
+            <a:schemeClr val="accent1"/>
+          </a:effectRef>
+          <a:fontRef idx="minor">
+            <a:schemeClr val="lt1"/>
+          </a:fontRef>
+        </p:style>
+        <p:txBody>
+          <a:bodyPr rtlCol="0" anchor="ctr"/>
+          <a:lstStyle/>
+          <a:p>
+            <a:pPr algn="ctr"/>
+            <a:r>
+              <a:rPr lang="nl-NL" dirty="0"/>
+              <a:t>:80	NGINX</a:t>
+            </a:r>
+          </a:p>
+        </p:txBody>
+      </p:sp>
+      <p:cxnSp>
+        <p:nvCxnSpPr>
+          <p:cNvPr id="14" name="Straight Arrow Connector 13"/>
+          <p:cNvCxnSpPr>
+            <a:stCxn id="12" idx="3"/>
+            <a:endCxn id="13" idx="1"/>
+          </p:cNvCxnSpPr>
+          <p:nvPr/>
+        </p:nvCxnSpPr>
+        <p:spPr>
+          <a:xfrm flipV="1">
+            <a:off x="5112975" y="3612962"/>
+            <a:ext cx="2157813" cy="11192"/>
+          </a:xfrm>
+          <a:prstGeom prst="straightConnector1">
+            <a:avLst/>
+          </a:prstGeom>
+          <a:ln w="31750">
+            <a:solidFill>
+              <a:schemeClr val="tx1"/>
+            </a:solidFill>
+            <a:tailEnd type="triangle"/>
+          </a:ln>
+        </p:spPr>
+        <p:style>
+          <a:lnRef idx="1">
+            <a:schemeClr val="accent1"/>
+          </a:lnRef>
+          <a:fillRef idx="0">
+            <a:schemeClr val="accent1"/>
+          </a:fillRef>
+          <a:effectRef idx="0">
+            <a:schemeClr val="accent1"/>
+          </a:effectRef>
+          <a:fontRef idx="minor">
+            <a:schemeClr val="tx1"/>
+          </a:fontRef>
+        </p:style>
+      </p:cxnSp>
+      <p:sp>
+        <p:nvSpPr>
+          <p:cNvPr id="15" name="TextBox 14"/>
+          <p:cNvSpPr txBox="1"/>
+          <p:nvPr/>
+        </p:nvSpPr>
+        <p:spPr>
+          <a:xfrm>
+            <a:off x="6635425" y="3690869"/>
+            <a:ext cx="715260" cy="369332"/>
+          </a:xfrm>
+          <a:prstGeom prst="rect">
+            <a:avLst/>
+          </a:prstGeom>
+          <a:noFill/>
+        </p:spPr>
+        <p:txBody>
+          <a:bodyPr wrap="none" rtlCol="0">
+            <a:spAutoFit/>
+          </a:bodyPr>
+          <a:lstStyle/>
+          <a:p>
+            <a:r>
+              <a:rPr lang="nl-NL" dirty="0"/>
+              <a:t>:4200</a:t>
+            </a:r>
+          </a:p>
+        </p:txBody>
+      </p:sp>
+      <p:sp>
+        <p:nvSpPr>
+          <p:cNvPr id="16" name="TextBox 15"/>
+          <p:cNvSpPr txBox="1"/>
+          <p:nvPr/>
+        </p:nvSpPr>
+        <p:spPr>
+          <a:xfrm>
+            <a:off x="7999707" y="1744448"/>
+            <a:ext cx="584968" cy="369332"/>
+          </a:xfrm>
+          <a:prstGeom prst="rect">
+            <a:avLst/>
+          </a:prstGeom>
+          <a:noFill/>
+        </p:spPr>
+        <p:txBody>
+          <a:bodyPr wrap="none" rtlCol="0">
+            <a:spAutoFit/>
+          </a:bodyPr>
+          <a:lstStyle/>
+          <a:p>
+            <a:r>
+              <a:rPr lang="nl-NL" dirty="0"/>
+              <a:t>web</a:t>
+            </a:r>
+          </a:p>
+        </p:txBody>
+      </p:sp>
+    </p:spTree>
+    <p:extLst>
+      <p:ext uri="{BB962C8B-B14F-4D97-AF65-F5344CB8AC3E}">
+        <p14:creationId xmlns:p14="http://schemas.microsoft.com/office/powerpoint/2010/main" val="2118024186"/>
+      </p:ext>
+    </p:extLst>
+  </p:cSld>
+  <p:clrMapOvr>
+    <a:masterClrMapping/>
+  </p:clrMapOvr>
+  <p:timing>
+    <p:tnLst>
+      <p:par>
+        <p:cTn id="1" dur="indefinite" restart="never" nodeType="tmRoot"/>
+      </p:par>
+    </p:tnLst>
+  </p:timing>
+</p:sld>
+</file>
+
+<file path=ppt/slides/slide4.xml><?xml version="1.0" encoding="utf-8"?>
+<p:sld xmlns:a="http://schemas.openxmlformats.org/drawingml/2006/main" xmlns:r="http://schemas.openxmlformats.org/officeDocument/2006/relationships" xmlns:p="http://schemas.openxmlformats.org/presentationml/2006/main">
+  <p:cSld>
+    <p:spTree>
+      <p:nvGrpSpPr>
+        <p:cNvPr id="1" name=""/>
+        <p:cNvGrpSpPr/>
+        <p:nvPr/>
+      </p:nvGrpSpPr>
+      <p:grpSpPr>
+        <a:xfrm>
+          <a:off x="0" y="0"/>
+          <a:ext cx="0" cy="0"/>
+          <a:chOff x="0" y="0"/>
+          <a:chExt cx="0" cy="0"/>
+        </a:xfrm>
+      </p:grpSpPr>
+      <p:sp>
+        <p:nvSpPr>
+          <p:cNvPr id="2" name="Title 1"/>
+          <p:cNvSpPr>
+            <a:spLocks noGrp="1"/>
+          </p:cNvSpPr>
+          <p:nvPr>
+            <p:ph type="title"/>
           </p:nvPr>
         </p:nvSpPr>
         <p:spPr/>
@@ -3953,8 +4368,47 @@
           <a:lstStyle/>
           <a:p>
             <a:r>
+              <a:rPr lang="en-US" dirty="0"/>
+              <a:t>Assignment 2</a:t>
+            </a:r>
+            <a:r>
               <a:rPr lang="en-US" dirty="0" smtClean="0"/>
-              <a:t>Clone de </a:t>
+              <a:t>: 2 containers </a:t>
+            </a:r>
+            <a:r>
+              <a:rPr lang="en-US" dirty="0" smtClean="0"/>
+              <a:t>with OSS</a:t>
+            </a:r>
+            <a:endParaRPr lang="nl-NL" dirty="0"/>
+          </a:p>
+        </p:txBody>
+      </p:sp>
+      <p:sp>
+        <p:nvSpPr>
+          <p:cNvPr id="3" name="Content Placeholder 2"/>
+          <p:cNvSpPr>
+            <a:spLocks noGrp="1"/>
+          </p:cNvSpPr>
+          <p:nvPr>
+            <p:ph idx="1"/>
+          </p:nvPr>
+        </p:nvSpPr>
+        <p:spPr/>
+        <p:txBody>
+          <a:bodyPr/>
+          <a:lstStyle/>
+          <a:p>
+            <a:pPr marL="457200" indent="-457200">
+              <a:buFont typeface="+mj-lt"/>
+              <a:buAutoNum type="arabicPeriod"/>
+            </a:pPr>
+            <a:r>
+              <a:rPr lang="en-US" dirty="0" smtClean="0"/>
+              <a:t>Clone </a:t>
+            </a:r>
+            <a:r>
+              <a:rPr lang="en-US" dirty="0" smtClean="0"/>
+              <a:t>the </a:t>
             </a:r>
             <a:r>
               <a:rPr lang="en-US" dirty="0" err="1" smtClean="0"/>
@@ -3962,17 +4416,33 @@
             </a:r>
             <a:r>
               <a:rPr lang="en-US" dirty="0" smtClean="0"/>
-              <a:t> repository (http</a:t>
-            </a:r>
-          </a:p>
-          <a:p>
-            <a:r>
-              <a:rPr lang="en-US" dirty="0" err="1" smtClean="0"/>
-              <a:t>Haal</a:t>
-            </a:r>
+              <a:t> repository (https://github.com/RenzoVeldkamp/WorkshopDockerMicroservices.git)</a:t>
+            </a:r>
+          </a:p>
+          <a:p>
+            <a:pPr marL="457200" indent="-457200">
+              <a:buFont typeface="+mj-lt"/>
+              <a:buAutoNum type="arabicPeriod"/>
+            </a:pPr>
             <a:r>
               <a:rPr lang="en-US" dirty="0" smtClean="0"/>
-              <a:t> de images </a:t>
+              <a:t>Change </a:t>
+            </a:r>
+            <a:r>
+              <a:rPr lang="en-US" dirty="0" smtClean="0"/>
+              <a:t>Index.html in </a:t>
+            </a:r>
+            <a:r>
+              <a:rPr lang="en-US" dirty="0" smtClean="0"/>
+              <a:t>the </a:t>
+            </a:r>
+            <a:r>
+              <a:rPr lang="en-US" dirty="0" smtClean="0"/>
+              <a:t>sources </a:t>
+            </a:r>
+            <a:r>
+              <a:rPr lang="en-US" dirty="0" smtClean="0"/>
+              <a:t>of the </a:t>
             </a:r>
             <a:r>
               <a:rPr lang="en-US" i="1" dirty="0" smtClean="0"/>
@@ -3980,15 +4450,80 @@
             </a:r>
             <a:r>
               <a:rPr lang="en-US" dirty="0" smtClean="0"/>
+              <a:t> container</a:t>
+            </a:r>
+            <a:endParaRPr lang="en-US" dirty="0" smtClean="0"/>
+          </a:p>
+          <a:p>
+            <a:pPr marL="457200" indent="-457200">
+              <a:buFont typeface="+mj-lt"/>
+              <a:buAutoNum type="arabicPeriod"/>
+            </a:pPr>
+            <a:r>
+              <a:rPr lang="en-US" dirty="0" smtClean="0"/>
+              <a:t>Build the image </a:t>
+            </a:r>
+            <a:r>
+              <a:rPr lang="en-US" i="1" dirty="0" smtClean="0"/>
+              <a:t>html</a:t>
+            </a:r>
+            <a:r>
+              <a:rPr lang="en-US" dirty="0" smtClean="0"/>
+              <a:t> (</a:t>
+            </a:r>
+            <a:r>
+              <a:rPr lang="en-US" b="1" i="1" dirty="0" err="1"/>
+              <a:t>docker</a:t>
+            </a:r>
+            <a:r>
+              <a:rPr lang="en-US" b="1" i="1" dirty="0"/>
+              <a:t> build</a:t>
+            </a:r>
+            <a:r>
+              <a:rPr lang="en-US" dirty="0" smtClean="0"/>
+              <a:t>)</a:t>
+            </a:r>
+          </a:p>
+          <a:p>
+            <a:pPr marL="457200" indent="-457200">
+              <a:buFont typeface="+mj-lt"/>
+              <a:buAutoNum type="arabicPeriod"/>
+            </a:pPr>
+            <a:r>
+              <a:rPr lang="en-US" dirty="0" smtClean="0"/>
+              <a:t>Pick your </a:t>
+            </a:r>
+            <a:r>
+              <a:rPr lang="en-US" dirty="0" err="1" smtClean="0"/>
+              <a:t>favourite</a:t>
+            </a:r>
+            <a:r>
+              <a:rPr lang="en-US" dirty="0" smtClean="0"/>
+              <a:t> movie in </a:t>
+            </a:r>
+            <a:r>
+              <a:rPr lang="en-US" dirty="0" err="1" smtClean="0"/>
+              <a:t>movies.json</a:t>
+            </a:r>
+            <a:r>
+              <a:rPr lang="en-US" dirty="0"/>
               <a:t> </a:t>
             </a:r>
             <a:r>
-              <a:rPr lang="en-US" dirty="0" err="1" smtClean="0"/>
-              <a:t>en</a:t>
-            </a:r>
-            <a:r>
               <a:rPr lang="en-US" dirty="0" smtClean="0"/>
-              <a:t> </a:t>
+              <a:t>in </a:t>
+            </a:r>
+            <a:r>
+              <a:rPr lang="en-US" dirty="0" smtClean="0"/>
+              <a:t>the </a:t>
+            </a:r>
+            <a:r>
+              <a:rPr lang="en-US" dirty="0" smtClean="0"/>
+              <a:t>sources </a:t>
+            </a:r>
+            <a:r>
+              <a:rPr lang="en-US" dirty="0" smtClean="0"/>
+              <a:t>of </a:t>
             </a:r>
             <a:r>
               <a:rPr lang="en-US" i="1" dirty="0" err="1" smtClean="0"/>
@@ -3996,27 +4531,38 @@
             </a:r>
             <a:r>
               <a:rPr lang="en-US" dirty="0" smtClean="0"/>
-              <a:t> op </a:t>
-            </a:r>
-            <a:r>
-              <a:rPr lang="en-US" dirty="0" err="1" smtClean="0"/>
-              <a:t>uit</a:t>
+              <a:t> (remove the other movie entries)</a:t>
+            </a:r>
+            <a:endParaRPr lang="en-US" dirty="0" smtClean="0"/>
+          </a:p>
+          <a:p>
+            <a:pPr marL="457200" indent="-457200">
+              <a:buFont typeface="+mj-lt"/>
+              <a:buAutoNum type="arabicPeriod"/>
+            </a:pPr>
+            <a:r>
+              <a:rPr lang="en-US" dirty="0"/>
+              <a:t>Build the </a:t>
             </a:r>
             <a:r>
               <a:rPr lang="en-US" dirty="0" smtClean="0"/>
-              <a:t> de </a:t>
-            </a:r>
-            <a:r>
-              <a:rPr lang="en-US" dirty="0" err="1" smtClean="0"/>
+              <a:t>image </a:t>
+            </a:r>
+            <a:r>
+              <a:rPr lang="en-US" i="1" dirty="0" err="1" smtClean="0"/>
+              <a:t>nodejsmovies</a:t>
+            </a:r>
+            <a:r>
+              <a:rPr lang="en-US" dirty="0" smtClean="0"/>
+              <a:t> (</a:t>
+            </a:r>
+            <a:r>
+              <a:rPr lang="en-US" b="1" i="1" dirty="0" err="1"/>
               <a:t>docker</a:t>
             </a:r>
             <a:r>
-              <a:rPr lang="en-US" dirty="0" smtClean="0"/>
-              <a:t> hub (</a:t>
-            </a:r>
-            <a:r>
-              <a:rPr lang="en-US" dirty="0" err="1" smtClean="0"/>
-              <a:t>centricms</a:t>
+              <a:rPr lang="en-US" b="1" i="1" dirty="0"/>
+              <a:t> build</a:t>
             </a:r>
             <a:r>
               <a:rPr lang="en-US" dirty="0" smtClean="0"/>
@@ -4024,57 +4570,25 @@
             </a:r>
           </a:p>
           <a:p>
+            <a:pPr marL="457200" indent="-457200">
+              <a:buFont typeface="+mj-lt"/>
+              <a:buAutoNum type="arabicPeriod"/>
+            </a:pPr>
             <a:r>
               <a:rPr lang="en-US" dirty="0" smtClean="0"/>
-              <a:t>Start de containers (run)</a:t>
-            </a:r>
-          </a:p>
-          <a:p>
-            <a:r>
-              <a:rPr lang="en-US" dirty="0" err="1" smtClean="0"/>
-              <a:t>Wijzig</a:t>
-            </a:r>
-            <a:r>
-              <a:rPr lang="en-US" dirty="0"/>
-              <a:t> </a:t>
+              <a:t>Run the </a:t>
             </a:r>
             <a:r>
               <a:rPr lang="en-US" dirty="0" smtClean="0"/>
-              <a:t>Index.html in de sources van </a:t>
-            </a:r>
-            <a:r>
-              <a:rPr lang="en-US" i="1" dirty="0" smtClean="0"/>
-              <a:t>html</a:t>
-            </a:r>
-            <a:r>
-              <a:rPr lang="en-US" dirty="0" smtClean="0"/>
-              <a:t> (NGINX)</a:t>
-            </a:r>
-          </a:p>
-          <a:p>
-            <a:r>
-              <a:rPr lang="en-US" dirty="0" err="1"/>
-              <a:t>Bouw</a:t>
-            </a:r>
-            <a:r>
-              <a:rPr lang="en-US" dirty="0"/>
-              <a:t> </a:t>
-            </a:r>
-            <a:r>
-              <a:rPr lang="en-US" dirty="0" smtClean="0"/>
-              <a:t>het image </a:t>
-            </a:r>
-            <a:r>
-              <a:rPr lang="en-US" i="1" dirty="0" smtClean="0"/>
-              <a:t>html</a:t>
-            </a:r>
-            <a:r>
-              <a:rPr lang="en-US" dirty="0" smtClean="0"/>
-              <a:t> </a:t>
-            </a:r>
-            <a:r>
-              <a:rPr lang="en-US" dirty="0"/>
-              <a:t>(build</a:t>
+              <a:t>containers (</a:t>
+            </a:r>
+            <a:r>
+              <a:rPr lang="en-US" b="1" i="1" dirty="0" err="1" smtClean="0"/>
+              <a:t>docker</a:t>
+            </a:r>
+            <a:r>
+              <a:rPr lang="en-US" b="1" i="1" dirty="0" smtClean="0"/>
+              <a:t> container run</a:t>
             </a:r>
             <a:r>
               <a:rPr lang="en-US" dirty="0" smtClean="0"/>
@@ -4082,53 +4596,25 @@
             </a:r>
           </a:p>
           <a:p>
-            <a:r>
-              <a:rPr lang="en-US" dirty="0" err="1" smtClean="0"/>
-              <a:t>Kies</a:t>
-            </a:r>
+            <a:pPr marL="457200" indent="-457200">
+              <a:buFont typeface="+mj-lt"/>
+              <a:buAutoNum type="arabicPeriod"/>
+            </a:pPr>
             <a:r>
               <a:rPr lang="en-US" dirty="0" smtClean="0"/>
-              <a:t> je </a:t>
-            </a:r>
-            <a:r>
-              <a:rPr lang="en-US" dirty="0" err="1" smtClean="0"/>
-              <a:t>eigen</a:t>
+              <a:t>Verify if all containers are running </a:t>
             </a:r>
             <a:r>
               <a:rPr lang="en-US" dirty="0" smtClean="0"/>
-              <a:t> film in </a:t>
-            </a:r>
-            <a:r>
-              <a:rPr lang="en-US" dirty="0" err="1" smtClean="0"/>
-              <a:t>movies.json</a:t>
-            </a:r>
-            <a:r>
-              <a:rPr lang="en-US" dirty="0"/>
-              <a:t> </a:t>
-            </a:r>
-            <a:r>
-              <a:rPr lang="en-US" dirty="0" smtClean="0"/>
-              <a:t>in de sources van </a:t>
-            </a:r>
-            <a:r>
-              <a:rPr lang="en-US" i="1" dirty="0" err="1" smtClean="0"/>
-              <a:t>nodejsmovies</a:t>
-            </a:r>
-            <a:r>
-              <a:rPr lang="en-US" dirty="0" smtClean="0"/>
-              <a:t> (</a:t>
-            </a:r>
-            <a:r>
-              <a:rPr lang="en-US" dirty="0" err="1" smtClean="0"/>
-              <a:t>ServerJS</a:t>
-            </a:r>
-            <a:r>
-              <a:rPr lang="en-US" dirty="0" smtClean="0"/>
-              <a:t>, </a:t>
-            </a:r>
-            <a:r>
-              <a:rPr lang="en-US" dirty="0" err="1" smtClean="0"/>
-              <a:t>etc</a:t>
+              <a:t>(</a:t>
+            </a:r>
+            <a:r>
+              <a:rPr lang="en-US" b="1" i="1" dirty="0" err="1" smtClean="0"/>
+              <a:t>docker</a:t>
+            </a:r>
+            <a:r>
+              <a:rPr lang="en-US" b="1" i="1" dirty="0" smtClean="0"/>
+              <a:t> container ls</a:t>
             </a:r>
             <a:r>
               <a:rPr lang="en-US" dirty="0" smtClean="0"/>
@@ -4136,28 +4622,59 @@
             </a:r>
           </a:p>
           <a:p>
-            <a:r>
-              <a:rPr lang="en-US" dirty="0" err="1" smtClean="0"/>
-              <a:t>Bouw</a:t>
-            </a:r>
-            <a:r>
-              <a:rPr lang="en-US" dirty="0" smtClean="0"/>
-              <a:t> het images </a:t>
-            </a:r>
-            <a:r>
-              <a:rPr lang="en-US" i="1" dirty="0" err="1" smtClean="0"/>
-              <a:t>nodejsmovies</a:t>
-            </a:r>
-            <a:r>
-              <a:rPr lang="en-US" dirty="0" smtClean="0"/>
-              <a:t> (build)</a:t>
-            </a:r>
-          </a:p>
-          <a:p>
-            <a:r>
-              <a:rPr lang="en-US" dirty="0" smtClean="0"/>
-              <a:t>Start de containers (run)</a:t>
-            </a:r>
+            <a:pPr marL="457200" indent="-457200">
+              <a:buFont typeface="+mj-lt"/>
+              <a:buAutoNum type="arabicPeriod"/>
+            </a:pPr>
+            <a:r>
+              <a:rPr lang="en-US" dirty="0" smtClean="0">
+                <a:sym typeface="Wingdings" panose="05000000000000000000" pitchFamily="2" charset="2"/>
+              </a:rPr>
+              <a:t>Verify using </a:t>
+            </a:r>
+            <a:r>
+              <a:rPr lang="en-US" dirty="0">
+                <a:sym typeface="Wingdings" panose="05000000000000000000" pitchFamily="2" charset="2"/>
+                <a:hlinkClick r:id="rId2"/>
+              </a:rPr>
+              <a:t>http://localhost:4200</a:t>
+            </a:r>
+            <a:r>
+              <a:rPr lang="en-US" dirty="0">
+                <a:sym typeface="Wingdings" panose="05000000000000000000" pitchFamily="2" charset="2"/>
+              </a:rPr>
+              <a:t> </a:t>
+            </a:r>
+            <a:r>
+              <a:rPr lang="en-US" dirty="0" smtClean="0">
+                <a:sym typeface="Wingdings" panose="05000000000000000000" pitchFamily="2" charset="2"/>
+              </a:rPr>
+              <a:t>if the complete </a:t>
+            </a:r>
+            <a:r>
+              <a:rPr lang="en-US" dirty="0" err="1">
+                <a:sym typeface="Wingdings" panose="05000000000000000000" pitchFamily="2" charset="2"/>
+              </a:rPr>
+              <a:t>applicatie</a:t>
+            </a:r>
+            <a:r>
+              <a:rPr lang="en-US" dirty="0">
+                <a:sym typeface="Wingdings" panose="05000000000000000000" pitchFamily="2" charset="2"/>
+              </a:rPr>
+              <a:t> </a:t>
+            </a:r>
+            <a:r>
+              <a:rPr lang="en-US" dirty="0" smtClean="0">
+                <a:sym typeface="Wingdings" panose="05000000000000000000" pitchFamily="2" charset="2"/>
+              </a:rPr>
+              <a:t>is working</a:t>
+            </a:r>
+            <a:endParaRPr lang="nl-NL" dirty="0"/>
+          </a:p>
+          <a:p>
+            <a:pPr marL="0" indent="0">
+              <a:buNone/>
+            </a:pPr>
             <a:endParaRPr lang="nl-NL" dirty="0"/>
           </a:p>
         </p:txBody>
@@ -4179,7 +4696,7 @@
           <a:p>
             <a:fld id="{AC3724A0-D062-4236-A510-F790F3437765}" type="datetime4">
               <a:rPr lang="en-US" smtClean="0"/>
-              <a:t>September 13, 2017</a:t>
+              <a:t>September 25, 2017</a:t>
             </a:fld>
             <a:endParaRPr lang="nl-NL" dirty="0"/>
           </a:p>
@@ -4212,6 +4729,1875 @@
     <p:extLst>
       <p:ext uri="{BB962C8B-B14F-4D97-AF65-F5344CB8AC3E}">
         <p14:creationId xmlns:p14="http://schemas.microsoft.com/office/powerpoint/2010/main" val="2226774799"/>
+      </p:ext>
+    </p:extLst>
+  </p:cSld>
+  <p:clrMapOvr>
+    <a:masterClrMapping/>
+  </p:clrMapOvr>
+  <p:timing>
+    <p:tnLst>
+      <p:par>
+        <p:cTn id="1" dur="indefinite" restart="never" nodeType="tmRoot"/>
+      </p:par>
+    </p:tnLst>
+  </p:timing>
+</p:sld>
+</file>
+
+<file path=ppt/slides/slide5.xml><?xml version="1.0" encoding="utf-8"?>
+<p:sld xmlns:a="http://schemas.openxmlformats.org/drawingml/2006/main" xmlns:r="http://schemas.openxmlformats.org/officeDocument/2006/relationships" xmlns:p="http://schemas.openxmlformats.org/presentationml/2006/main">
+  <p:cSld>
+    <p:spTree>
+      <p:nvGrpSpPr>
+        <p:cNvPr id="1" name=""/>
+        <p:cNvGrpSpPr/>
+        <p:nvPr/>
+      </p:nvGrpSpPr>
+      <p:grpSpPr>
+        <a:xfrm>
+          <a:off x="0" y="0"/>
+          <a:ext cx="0" cy="0"/>
+          <a:chOff x="0" y="0"/>
+          <a:chExt cx="0" cy="0"/>
+        </a:xfrm>
+      </p:grpSpPr>
+      <p:sp>
+        <p:nvSpPr>
+          <p:cNvPr id="4" name="Title 3"/>
+          <p:cNvSpPr>
+            <a:spLocks noGrp="1"/>
+          </p:cNvSpPr>
+          <p:nvPr>
+            <p:ph type="title"/>
+          </p:nvPr>
+        </p:nvSpPr>
+        <p:spPr/>
+        <p:txBody>
+          <a:bodyPr/>
+          <a:lstStyle/>
+          <a:p>
+            <a:r>
+              <a:rPr lang="nl-NL" dirty="0" smtClean="0"/>
+              <a:t>Infrastructuur OSS-opdracht</a:t>
+            </a:r>
+            <a:endParaRPr lang="nl-NL" dirty="0"/>
+          </a:p>
+        </p:txBody>
+      </p:sp>
+      <p:sp>
+        <p:nvSpPr>
+          <p:cNvPr id="51" name="Smiley Face 50"/>
+          <p:cNvSpPr/>
+          <p:nvPr/>
+        </p:nvSpPr>
+        <p:spPr>
+          <a:xfrm>
+            <a:off x="1010861" y="1693012"/>
+            <a:ext cx="941832" cy="877824"/>
+          </a:xfrm>
+          <a:prstGeom prst="smileyFace">
+            <a:avLst/>
+          </a:prstGeom>
+          <a:gradFill>
+            <a:gsLst>
+              <a:gs pos="0">
+                <a:srgbClr val="5B9BD5">
+                  <a:lumMod val="5000"/>
+                  <a:lumOff val="95000"/>
+                </a:srgbClr>
+              </a:gs>
+              <a:gs pos="74000">
+                <a:srgbClr val="5B9BD5">
+                  <a:lumMod val="45000"/>
+                  <a:lumOff val="55000"/>
+                </a:srgbClr>
+              </a:gs>
+              <a:gs pos="83000">
+                <a:srgbClr val="5B9BD5">
+                  <a:lumMod val="45000"/>
+                  <a:lumOff val="55000"/>
+                </a:srgbClr>
+              </a:gs>
+              <a:gs pos="100000">
+                <a:srgbClr val="5B9BD5">
+                  <a:lumMod val="30000"/>
+                  <a:lumOff val="70000"/>
+                </a:srgbClr>
+              </a:gs>
+            </a:gsLst>
+            <a:lin ang="5400000" scaled="1"/>
+          </a:gradFill>
+          <a:ln w="12700" cap="flat" cmpd="sng" algn="ctr">
+            <a:solidFill>
+              <a:srgbClr val="5B9BD5">
+                <a:shade val="50000"/>
+              </a:srgbClr>
+            </a:solidFill>
+            <a:prstDash val="solid"/>
+            <a:miter lim="800000"/>
+          </a:ln>
+          <a:effectLst/>
+        </p:spPr>
+        <p:txBody>
+          <a:bodyPr rtlCol="0" anchor="ctr"/>
+          <a:lstStyle/>
+          <a:p>
+            <a:pPr algn="ctr"/>
+            <a:endParaRPr lang="nl-NL" kern="0">
+              <a:solidFill>
+                <a:prstClr val="white"/>
+              </a:solidFill>
+              <a:latin typeface="Calibri" panose="020F0502020204030204"/>
+            </a:endParaRPr>
+          </a:p>
+        </p:txBody>
+      </p:sp>
+      <p:pic>
+        <p:nvPicPr>
+          <p:cNvPr id="52" name="Picture 51"/>
+          <p:cNvPicPr>
+            <a:picLocks noChangeAspect="1"/>
+          </p:cNvPicPr>
+          <p:nvPr/>
+        </p:nvPicPr>
+        <p:blipFill>
+          <a:blip r:embed="rId2">
+            <a:extLst>
+              <a:ext uri="{28A0092B-C50C-407E-A947-70E740481C1C}">
+                <a14:useLocalDpi xmlns:a14="http://schemas.microsoft.com/office/drawing/2010/main" val="0"/>
+              </a:ext>
+            </a:extLst>
+          </a:blip>
+          <a:stretch>
+            <a:fillRect/>
+          </a:stretch>
+        </p:blipFill>
+        <p:spPr>
+          <a:xfrm>
+            <a:off x="600965" y="2821016"/>
+            <a:ext cx="2606184" cy="1744190"/>
+          </a:xfrm>
+          <a:prstGeom prst="rect">
+            <a:avLst/>
+          </a:prstGeom>
+          <a:ln w="19050">
+            <a:solidFill>
+              <a:srgbClr val="5B9BD5">
+                <a:shade val="50000"/>
+              </a:srgbClr>
+            </a:solidFill>
+          </a:ln>
+        </p:spPr>
+      </p:pic>
+      <p:sp>
+        <p:nvSpPr>
+          <p:cNvPr id="53" name="Rectangle 52"/>
+          <p:cNvSpPr/>
+          <p:nvPr/>
+        </p:nvSpPr>
+        <p:spPr>
+          <a:xfrm>
+            <a:off x="5364963" y="2305455"/>
+            <a:ext cx="2042809" cy="2752928"/>
+          </a:xfrm>
+          <a:prstGeom prst="rect">
+            <a:avLst/>
+          </a:prstGeom>
+          <a:solidFill>
+            <a:srgbClr val="70AD47">
+              <a:lumMod val="75000"/>
+            </a:srgbClr>
+          </a:solidFill>
+          <a:ln w="12700" cap="flat" cmpd="sng" algn="ctr">
+            <a:solidFill>
+              <a:srgbClr val="5B9BD5">
+                <a:shade val="50000"/>
+              </a:srgbClr>
+            </a:solidFill>
+            <a:prstDash val="solid"/>
+            <a:miter lim="800000"/>
+          </a:ln>
+          <a:effectLst/>
+        </p:spPr>
+        <p:txBody>
+          <a:bodyPr rtlCol="0" anchor="ctr"/>
+          <a:lstStyle/>
+          <a:p>
+            <a:pPr algn="ctr"/>
+            <a:r>
+              <a:rPr lang="nl-NL" kern="0" dirty="0">
+                <a:solidFill>
+                  <a:prstClr val="white"/>
+                </a:solidFill>
+                <a:latin typeface="Calibri" panose="020F0502020204030204"/>
+              </a:rPr>
+              <a:t>:80	NGINX</a:t>
+            </a:r>
+          </a:p>
+        </p:txBody>
+      </p:sp>
+      <p:cxnSp>
+        <p:nvCxnSpPr>
+          <p:cNvPr id="54" name="Straight Arrow Connector 53"/>
+          <p:cNvCxnSpPr>
+            <a:stCxn id="52" idx="3"/>
+            <a:endCxn id="53" idx="1"/>
+          </p:cNvCxnSpPr>
+          <p:nvPr/>
+        </p:nvCxnSpPr>
+        <p:spPr>
+          <a:xfrm flipV="1">
+            <a:off x="3207150" y="3681919"/>
+            <a:ext cx="2157813" cy="11192"/>
+          </a:xfrm>
+          <a:prstGeom prst="straightConnector1">
+            <a:avLst/>
+          </a:prstGeom>
+          <a:noFill/>
+          <a:ln w="31750" cap="flat" cmpd="sng" algn="ctr">
+            <a:solidFill>
+              <a:sysClr val="windowText" lastClr="000000"/>
+            </a:solidFill>
+            <a:prstDash val="solid"/>
+            <a:miter lim="800000"/>
+            <a:tailEnd type="triangle"/>
+          </a:ln>
+          <a:effectLst/>
+        </p:spPr>
+      </p:cxnSp>
+      <p:sp>
+        <p:nvSpPr>
+          <p:cNvPr id="55" name="TextBox 54"/>
+          <p:cNvSpPr txBox="1"/>
+          <p:nvPr/>
+        </p:nvSpPr>
+        <p:spPr>
+          <a:xfrm>
+            <a:off x="4729600" y="3759826"/>
+            <a:ext cx="715260" cy="369332"/>
+          </a:xfrm>
+          <a:prstGeom prst="rect">
+            <a:avLst/>
+          </a:prstGeom>
+          <a:noFill/>
+        </p:spPr>
+        <p:txBody>
+          <a:bodyPr wrap="none" rtlCol="0">
+            <a:spAutoFit/>
+          </a:bodyPr>
+          <a:lstStyle/>
+          <a:p>
+            <a:r>
+              <a:rPr lang="nl-NL" kern="0" dirty="0">
+                <a:solidFill>
+                  <a:prstClr val="black"/>
+                </a:solidFill>
+              </a:rPr>
+              <a:t>:4200</a:t>
+            </a:r>
+          </a:p>
+        </p:txBody>
+      </p:sp>
+      <p:sp>
+        <p:nvSpPr>
+          <p:cNvPr id="56" name="Rectangle 55"/>
+          <p:cNvSpPr/>
+          <p:nvPr/>
+        </p:nvSpPr>
+        <p:spPr>
+          <a:xfrm>
+            <a:off x="9479100" y="2305455"/>
+            <a:ext cx="2149812" cy="2752928"/>
+          </a:xfrm>
+          <a:prstGeom prst="rect">
+            <a:avLst/>
+          </a:prstGeom>
+          <a:solidFill>
+            <a:srgbClr val="70AD47">
+              <a:lumMod val="75000"/>
+            </a:srgbClr>
+          </a:solidFill>
+          <a:ln w="12700" cap="flat" cmpd="sng" algn="ctr">
+            <a:solidFill>
+              <a:srgbClr val="5B9BD5">
+                <a:shade val="50000"/>
+              </a:srgbClr>
+            </a:solidFill>
+            <a:prstDash val="solid"/>
+            <a:miter lim="800000"/>
+          </a:ln>
+          <a:effectLst/>
+        </p:spPr>
+        <p:txBody>
+          <a:bodyPr rtlCol="0" anchor="ctr"/>
+          <a:lstStyle/>
+          <a:p>
+            <a:pPr algn="ctr"/>
+            <a:r>
+              <a:rPr lang="nl-NL" kern="0" dirty="0">
+                <a:solidFill>
+                  <a:prstClr val="white"/>
+                </a:solidFill>
+                <a:latin typeface="Calibri" panose="020F0502020204030204"/>
+              </a:rPr>
+              <a:t>:4201	SERVERJS</a:t>
+            </a:r>
+          </a:p>
+        </p:txBody>
+      </p:sp>
+      <p:cxnSp>
+        <p:nvCxnSpPr>
+          <p:cNvPr id="57" name="Straight Arrow Connector 56"/>
+          <p:cNvCxnSpPr>
+            <a:stCxn id="53" idx="3"/>
+            <a:endCxn id="56" idx="1"/>
+          </p:cNvCxnSpPr>
+          <p:nvPr/>
+        </p:nvCxnSpPr>
+        <p:spPr>
+          <a:xfrm>
+            <a:off x="7407772" y="3681919"/>
+            <a:ext cx="2071328" cy="0"/>
+          </a:xfrm>
+          <a:prstGeom prst="straightConnector1">
+            <a:avLst/>
+          </a:prstGeom>
+          <a:noFill/>
+          <a:ln w="31750" cap="flat" cmpd="sng" algn="ctr">
+            <a:solidFill>
+              <a:sysClr val="windowText" lastClr="000000"/>
+            </a:solidFill>
+            <a:prstDash val="solid"/>
+            <a:miter lim="800000"/>
+            <a:tailEnd type="triangle"/>
+          </a:ln>
+          <a:effectLst/>
+        </p:spPr>
+      </p:cxnSp>
+      <p:sp>
+        <p:nvSpPr>
+          <p:cNvPr id="58" name="TextBox 57"/>
+          <p:cNvSpPr txBox="1"/>
+          <p:nvPr/>
+        </p:nvSpPr>
+        <p:spPr>
+          <a:xfrm>
+            <a:off x="7585074" y="3292034"/>
+            <a:ext cx="1312795" cy="369332"/>
+          </a:xfrm>
+          <a:prstGeom prst="rect">
+            <a:avLst/>
+          </a:prstGeom>
+          <a:noFill/>
+        </p:spPr>
+        <p:txBody>
+          <a:bodyPr wrap="none" rtlCol="0">
+            <a:spAutoFit/>
+          </a:bodyPr>
+          <a:lstStyle/>
+          <a:p>
+            <a:r>
+              <a:rPr lang="nl-NL" kern="0" dirty="0">
+                <a:solidFill>
+                  <a:prstClr val="black"/>
+                </a:solidFill>
+              </a:rPr>
+              <a:t>/</a:t>
+            </a:r>
+            <a:r>
+              <a:rPr lang="nl-NL" kern="0" dirty="0" err="1">
+                <a:solidFill>
+                  <a:prstClr val="black"/>
+                </a:solidFill>
+              </a:rPr>
+              <a:t>api</a:t>
+            </a:r>
+            <a:r>
+              <a:rPr lang="nl-NL" kern="0" dirty="0">
+                <a:solidFill>
+                  <a:prstClr val="black"/>
+                </a:solidFill>
+              </a:rPr>
+              <a:t>/</a:t>
+            </a:r>
+            <a:r>
+              <a:rPr lang="nl-NL" kern="0" dirty="0" err="1">
+                <a:solidFill>
+                  <a:prstClr val="black"/>
+                </a:solidFill>
+              </a:rPr>
+              <a:t>movies</a:t>
+            </a:r>
+            <a:endParaRPr lang="nl-NL" kern="0" dirty="0">
+              <a:solidFill>
+                <a:prstClr val="black"/>
+              </a:solidFill>
+            </a:endParaRPr>
+          </a:p>
+        </p:txBody>
+      </p:sp>
+      <p:sp>
+        <p:nvSpPr>
+          <p:cNvPr id="59" name="TextBox 58"/>
+          <p:cNvSpPr txBox="1"/>
+          <p:nvPr/>
+        </p:nvSpPr>
+        <p:spPr>
+          <a:xfrm>
+            <a:off x="8813402" y="3702473"/>
+            <a:ext cx="715260" cy="369332"/>
+          </a:xfrm>
+          <a:prstGeom prst="rect">
+            <a:avLst/>
+          </a:prstGeom>
+          <a:noFill/>
+        </p:spPr>
+        <p:txBody>
+          <a:bodyPr wrap="none" rtlCol="0">
+            <a:spAutoFit/>
+          </a:bodyPr>
+          <a:lstStyle/>
+          <a:p>
+            <a:r>
+              <a:rPr lang="nl-NL" kern="0" dirty="0">
+                <a:solidFill>
+                  <a:prstClr val="black"/>
+                </a:solidFill>
+              </a:rPr>
+              <a:t>:8090</a:t>
+            </a:r>
+          </a:p>
+        </p:txBody>
+      </p:sp>
+      <p:sp>
+        <p:nvSpPr>
+          <p:cNvPr id="60" name="TextBox 59"/>
+          <p:cNvSpPr txBox="1"/>
+          <p:nvPr/>
+        </p:nvSpPr>
+        <p:spPr>
+          <a:xfrm>
+            <a:off x="6093882" y="1813405"/>
+            <a:ext cx="584968" cy="369332"/>
+          </a:xfrm>
+          <a:prstGeom prst="rect">
+            <a:avLst/>
+          </a:prstGeom>
+          <a:noFill/>
+        </p:spPr>
+        <p:txBody>
+          <a:bodyPr wrap="none" rtlCol="0">
+            <a:spAutoFit/>
+          </a:bodyPr>
+          <a:lstStyle/>
+          <a:p>
+            <a:r>
+              <a:rPr lang="nl-NL" kern="0" dirty="0">
+                <a:solidFill>
+                  <a:prstClr val="black"/>
+                </a:solidFill>
+              </a:rPr>
+              <a:t>web</a:t>
+            </a:r>
+          </a:p>
+        </p:txBody>
+      </p:sp>
+      <p:sp>
+        <p:nvSpPr>
+          <p:cNvPr id="61" name="TextBox 60"/>
+          <p:cNvSpPr txBox="1"/>
+          <p:nvPr/>
+        </p:nvSpPr>
+        <p:spPr>
+          <a:xfrm>
+            <a:off x="10319006" y="1813405"/>
+            <a:ext cx="470000" cy="369332"/>
+          </a:xfrm>
+          <a:prstGeom prst="rect">
+            <a:avLst/>
+          </a:prstGeom>
+          <a:noFill/>
+        </p:spPr>
+        <p:txBody>
+          <a:bodyPr wrap="none" rtlCol="0">
+            <a:spAutoFit/>
+          </a:bodyPr>
+          <a:lstStyle/>
+          <a:p>
+            <a:r>
+              <a:rPr lang="nl-NL" kern="0" dirty="0" err="1">
+                <a:solidFill>
+                  <a:prstClr val="black"/>
+                </a:solidFill>
+              </a:rPr>
+              <a:t>api</a:t>
+            </a:r>
+            <a:endParaRPr lang="nl-NL" kern="0" dirty="0">
+              <a:solidFill>
+                <a:prstClr val="black"/>
+              </a:solidFill>
+            </a:endParaRPr>
+          </a:p>
+        </p:txBody>
+      </p:sp>
+    </p:spTree>
+    <p:extLst>
+      <p:ext uri="{BB962C8B-B14F-4D97-AF65-F5344CB8AC3E}">
+        <p14:creationId xmlns:p14="http://schemas.microsoft.com/office/powerpoint/2010/main" val="3701349040"/>
+      </p:ext>
+    </p:extLst>
+  </p:cSld>
+  <p:clrMapOvr>
+    <a:masterClrMapping/>
+  </p:clrMapOvr>
+  <p:timing>
+    <p:tnLst>
+      <p:par>
+        <p:cTn id="1" dur="indefinite" restart="never" nodeType="tmRoot"/>
+      </p:par>
+    </p:tnLst>
+  </p:timing>
+</p:sld>
+</file>
+
+<file path=ppt/slides/slide6.xml><?xml version="1.0" encoding="utf-8"?>
+<p:sld xmlns:a="http://schemas.openxmlformats.org/drawingml/2006/main" xmlns:r="http://schemas.openxmlformats.org/officeDocument/2006/relationships" xmlns:p="http://schemas.openxmlformats.org/presentationml/2006/main">
+  <p:cSld>
+    <p:spTree>
+      <p:nvGrpSpPr>
+        <p:cNvPr id="1" name=""/>
+        <p:cNvGrpSpPr/>
+        <p:nvPr/>
+      </p:nvGrpSpPr>
+      <p:grpSpPr>
+        <a:xfrm>
+          <a:off x="0" y="0"/>
+          <a:ext cx="0" cy="0"/>
+          <a:chOff x="0" y="0"/>
+          <a:chExt cx="0" cy="0"/>
+        </a:xfrm>
+      </p:grpSpPr>
+      <p:sp>
+        <p:nvSpPr>
+          <p:cNvPr id="2" name="Title 1"/>
+          <p:cNvSpPr>
+            <a:spLocks noGrp="1"/>
+          </p:cNvSpPr>
+          <p:nvPr>
+            <p:ph type="title"/>
+          </p:nvPr>
+        </p:nvSpPr>
+        <p:spPr/>
+        <p:txBody>
+          <a:bodyPr/>
+          <a:lstStyle/>
+          <a:p>
+            <a:r>
+              <a:rPr lang="en-US" dirty="0"/>
+              <a:t>Assignment 3</a:t>
+            </a:r>
+            <a:r>
+              <a:rPr lang="en-US" dirty="0" smtClean="0"/>
+              <a:t>: 3 containers, 2 x OSS, 1 x </a:t>
+            </a:r>
+            <a:r>
+              <a:rPr lang="en-US" dirty="0" err="1" smtClean="0"/>
+              <a:t>.Net</a:t>
+            </a:r>
+            <a:endParaRPr lang="nl-NL" dirty="0"/>
+          </a:p>
+        </p:txBody>
+      </p:sp>
+      <p:sp>
+        <p:nvSpPr>
+          <p:cNvPr id="3" name="Content Placeholder 2"/>
+          <p:cNvSpPr>
+            <a:spLocks noGrp="1"/>
+          </p:cNvSpPr>
+          <p:nvPr>
+            <p:ph idx="1"/>
+          </p:nvPr>
+        </p:nvSpPr>
+        <p:spPr/>
+        <p:txBody>
+          <a:bodyPr/>
+          <a:lstStyle/>
+          <a:p>
+            <a:r>
+              <a:rPr lang="en-US" dirty="0" smtClean="0"/>
+              <a:t>Steps </a:t>
+            </a:r>
+            <a:r>
+              <a:rPr lang="en-US" dirty="0" smtClean="0"/>
+              <a:t>1 </a:t>
+            </a:r>
+            <a:r>
+              <a:rPr lang="en-US" dirty="0" smtClean="0"/>
+              <a:t>to </a:t>
+            </a:r>
+            <a:r>
+              <a:rPr lang="en-US" dirty="0" smtClean="0"/>
+              <a:t>7 </a:t>
+            </a:r>
+            <a:r>
+              <a:rPr lang="en-US" dirty="0" smtClean="0"/>
+              <a:t>are the same as in assignment 2</a:t>
+            </a:r>
+            <a:endParaRPr lang="en-US" dirty="0" smtClean="0"/>
+          </a:p>
+          <a:p>
+            <a:r>
+              <a:rPr lang="en-US" dirty="0" smtClean="0"/>
+              <a:t>Build the </a:t>
+            </a:r>
+            <a:r>
+              <a:rPr lang="en-US" dirty="0" smtClean="0"/>
+              <a:t>image </a:t>
+            </a:r>
+            <a:r>
+              <a:rPr lang="en-US" i="1" dirty="0" err="1" smtClean="0"/>
+              <a:t>mvc</a:t>
+            </a:r>
+            <a:r>
+              <a:rPr lang="en-US" dirty="0"/>
+              <a:t> (</a:t>
+            </a:r>
+            <a:r>
+              <a:rPr lang="en-US" b="1" i="1" dirty="0" err="1"/>
+              <a:t>docker</a:t>
+            </a:r>
+            <a:r>
+              <a:rPr lang="en-US" b="1" i="1" dirty="0"/>
+              <a:t> build</a:t>
+            </a:r>
+            <a:r>
+              <a:rPr lang="en-US" dirty="0"/>
+              <a:t>)</a:t>
+            </a:r>
+            <a:endParaRPr lang="en-US" dirty="0" smtClean="0"/>
+          </a:p>
+          <a:p>
+            <a:r>
+              <a:rPr lang="en-US" dirty="0" smtClean="0"/>
+              <a:t>Run all containers (</a:t>
+            </a:r>
+            <a:r>
+              <a:rPr lang="en-US" b="1" i="1" dirty="0" err="1"/>
+              <a:t>docker</a:t>
+            </a:r>
+            <a:r>
+              <a:rPr lang="en-US" b="1" i="1" dirty="0"/>
+              <a:t> container run</a:t>
+            </a:r>
+            <a:r>
+              <a:rPr lang="en-US" dirty="0" smtClean="0"/>
+              <a:t>)</a:t>
+            </a:r>
+            <a:r>
+              <a:rPr lang="en-US" dirty="0" smtClean="0"/>
+              <a:t/>
+            </a:r>
+            <a:br>
+              <a:rPr lang="en-US" dirty="0" smtClean="0"/>
+            </a:br>
+            <a:r>
+              <a:rPr lang="en-US" dirty="0" smtClean="0">
+                <a:sym typeface="Wingdings" panose="05000000000000000000" pitchFamily="2" charset="2"/>
+              </a:rPr>
+              <a:t> </a:t>
+            </a:r>
+            <a:r>
+              <a:rPr lang="en-US" dirty="0" smtClean="0">
+                <a:sym typeface="Wingdings" panose="05000000000000000000" pitchFamily="2" charset="2"/>
+              </a:rPr>
+              <a:t>You should now have 3 </a:t>
+            </a:r>
+            <a:r>
+              <a:rPr lang="en-US" dirty="0" smtClean="0">
+                <a:sym typeface="Wingdings" panose="05000000000000000000" pitchFamily="2" charset="2"/>
+              </a:rPr>
+              <a:t>containers </a:t>
+            </a:r>
+            <a:r>
+              <a:rPr lang="en-US" smtClean="0">
+                <a:sym typeface="Wingdings" panose="05000000000000000000" pitchFamily="2" charset="2"/>
+              </a:rPr>
+              <a:t>running locally</a:t>
+            </a:r>
+            <a:endParaRPr lang="en-US" dirty="0">
+              <a:sym typeface="Wingdings" panose="05000000000000000000" pitchFamily="2" charset="2"/>
+            </a:endParaRPr>
+          </a:p>
+          <a:p>
+            <a:r>
+              <a:rPr lang="en-US" dirty="0" smtClean="0">
+                <a:sym typeface="Wingdings" panose="05000000000000000000" pitchFamily="2" charset="2"/>
+              </a:rPr>
+              <a:t>Verify </a:t>
+            </a:r>
+            <a:r>
+              <a:rPr lang="en-US" dirty="0">
+                <a:sym typeface="Wingdings" panose="05000000000000000000" pitchFamily="2" charset="2"/>
+              </a:rPr>
+              <a:t>using </a:t>
+            </a:r>
+            <a:r>
+              <a:rPr lang="en-US" dirty="0">
+                <a:sym typeface="Wingdings" panose="05000000000000000000" pitchFamily="2" charset="2"/>
+                <a:hlinkClick r:id="rId2"/>
+              </a:rPr>
+              <a:t>http://localhost:4200</a:t>
+            </a:r>
+            <a:r>
+              <a:rPr lang="en-US" dirty="0">
+                <a:sym typeface="Wingdings" panose="05000000000000000000" pitchFamily="2" charset="2"/>
+              </a:rPr>
+              <a:t> if the complete </a:t>
+            </a:r>
+            <a:r>
+              <a:rPr lang="en-US" dirty="0" err="1">
+                <a:sym typeface="Wingdings" panose="05000000000000000000" pitchFamily="2" charset="2"/>
+              </a:rPr>
+              <a:t>applicatie</a:t>
+            </a:r>
+            <a:r>
+              <a:rPr lang="en-US" dirty="0">
+                <a:sym typeface="Wingdings" panose="05000000000000000000" pitchFamily="2" charset="2"/>
+              </a:rPr>
+              <a:t> is working</a:t>
+            </a:r>
+            <a:endParaRPr lang="nl-NL" dirty="0"/>
+          </a:p>
+        </p:txBody>
+      </p:sp>
+      <p:sp>
+        <p:nvSpPr>
+          <p:cNvPr id="4" name="Date Placeholder 3"/>
+          <p:cNvSpPr>
+            <a:spLocks noGrp="1"/>
+          </p:cNvSpPr>
+          <p:nvPr>
+            <p:ph type="dt" sz="half" idx="10"/>
+          </p:nvPr>
+        </p:nvSpPr>
+        <p:spPr/>
+        <p:txBody>
+          <a:bodyPr/>
+          <a:lstStyle/>
+          <a:p>
+            <a:fld id="{AC3724A0-D062-4236-A510-F790F3437765}" type="datetime4">
+              <a:rPr lang="en-US" smtClean="0"/>
+              <a:t>September 25, 2017</a:t>
+            </a:fld>
+            <a:endParaRPr lang="nl-NL" dirty="0"/>
+          </a:p>
+        </p:txBody>
+      </p:sp>
+      <p:sp>
+        <p:nvSpPr>
+          <p:cNvPr id="5" name="Footer Placeholder 4"/>
+          <p:cNvSpPr>
+            <a:spLocks noGrp="1"/>
+          </p:cNvSpPr>
+          <p:nvPr>
+            <p:ph type="ftr" sz="quarter" idx="11"/>
+          </p:nvPr>
+        </p:nvSpPr>
+        <p:spPr/>
+        <p:txBody>
+          <a:bodyPr/>
+          <a:lstStyle/>
+          <a:p>
+            <a:r>
+              <a:rPr lang="nl-NL" smtClean="0"/>
+              <a:t>Johannes Sim &amp; Renzo Veldkamp</a:t>
+            </a:r>
+            <a:endParaRPr lang="nl-NL" dirty="0"/>
+          </a:p>
+        </p:txBody>
+      </p:sp>
+    </p:spTree>
+    <p:extLst>
+      <p:ext uri="{BB962C8B-B14F-4D97-AF65-F5344CB8AC3E}">
+        <p14:creationId xmlns:p14="http://schemas.microsoft.com/office/powerpoint/2010/main" val="1744993247"/>
+      </p:ext>
+    </p:extLst>
+  </p:cSld>
+  <p:clrMapOvr>
+    <a:masterClrMapping/>
+  </p:clrMapOvr>
+  <p:timing>
+    <p:tnLst>
+      <p:par>
+        <p:cTn id="1" dur="indefinite" restart="never" nodeType="tmRoot"/>
+      </p:par>
+    </p:tnLst>
+  </p:timing>
+</p:sld>
+</file>
+
+<file path=ppt/slides/slide7.xml><?xml version="1.0" encoding="utf-8"?>
+<p:sld xmlns:a="http://schemas.openxmlformats.org/drawingml/2006/main" xmlns:r="http://schemas.openxmlformats.org/officeDocument/2006/relationships" xmlns:p="http://schemas.openxmlformats.org/presentationml/2006/main">
+  <p:cSld>
+    <p:spTree>
+      <p:nvGrpSpPr>
+        <p:cNvPr id="1" name=""/>
+        <p:cNvGrpSpPr/>
+        <p:nvPr/>
+      </p:nvGrpSpPr>
+      <p:grpSpPr>
+        <a:xfrm>
+          <a:off x="0" y="0"/>
+          <a:ext cx="0" cy="0"/>
+          <a:chOff x="0" y="0"/>
+          <a:chExt cx="0" cy="0"/>
+        </a:xfrm>
+      </p:grpSpPr>
+      <p:sp>
+        <p:nvSpPr>
+          <p:cNvPr id="4" name="Title 3"/>
+          <p:cNvSpPr>
+            <a:spLocks noGrp="1"/>
+          </p:cNvSpPr>
+          <p:nvPr>
+            <p:ph type="title"/>
+          </p:nvPr>
+        </p:nvSpPr>
+        <p:spPr/>
+        <p:txBody>
+          <a:bodyPr/>
+          <a:lstStyle/>
+          <a:p>
+            <a:r>
+              <a:rPr lang="nl-NL" dirty="0" smtClean="0"/>
+              <a:t>Infrastructuur 102-opdracht</a:t>
+            </a:r>
+            <a:endParaRPr lang="nl-NL" dirty="0"/>
+          </a:p>
+        </p:txBody>
+      </p:sp>
+      <p:sp>
+        <p:nvSpPr>
+          <p:cNvPr id="40" name="Smiley Face 39"/>
+          <p:cNvSpPr/>
+          <p:nvPr/>
+        </p:nvSpPr>
+        <p:spPr>
+          <a:xfrm>
+            <a:off x="694554" y="1693012"/>
+            <a:ext cx="941832" cy="877824"/>
+          </a:xfrm>
+          <a:prstGeom prst="smileyFace">
+            <a:avLst/>
+          </a:prstGeom>
+          <a:gradFill>
+            <a:gsLst>
+              <a:gs pos="0">
+                <a:srgbClr val="5B9BD5">
+                  <a:lumMod val="5000"/>
+                  <a:lumOff val="95000"/>
+                </a:srgbClr>
+              </a:gs>
+              <a:gs pos="74000">
+                <a:srgbClr val="5B9BD5">
+                  <a:lumMod val="45000"/>
+                  <a:lumOff val="55000"/>
+                </a:srgbClr>
+              </a:gs>
+              <a:gs pos="83000">
+                <a:srgbClr val="5B9BD5">
+                  <a:lumMod val="45000"/>
+                  <a:lumOff val="55000"/>
+                </a:srgbClr>
+              </a:gs>
+              <a:gs pos="100000">
+                <a:srgbClr val="5B9BD5">
+                  <a:lumMod val="30000"/>
+                  <a:lumOff val="70000"/>
+                </a:srgbClr>
+              </a:gs>
+            </a:gsLst>
+            <a:lin ang="5400000" scaled="1"/>
+          </a:gradFill>
+          <a:ln w="12700" cap="flat" cmpd="sng" algn="ctr">
+            <a:solidFill>
+              <a:srgbClr val="5B9BD5">
+                <a:shade val="50000"/>
+              </a:srgbClr>
+            </a:solidFill>
+            <a:prstDash val="solid"/>
+            <a:miter lim="800000"/>
+          </a:ln>
+          <a:effectLst/>
+        </p:spPr>
+        <p:txBody>
+          <a:bodyPr rtlCol="0" anchor="ctr"/>
+          <a:lstStyle/>
+          <a:p>
+            <a:pPr marL="0" marR="0" lvl="0" indent="0" algn="ctr" defTabSz="914400" eaLnBrk="1" fontAlgn="auto" latinLnBrk="0" hangingPunct="1">
+              <a:lnSpc>
+                <a:spcPct val="100000"/>
+              </a:lnSpc>
+              <a:spcBef>
+                <a:spcPts val="0"/>
+              </a:spcBef>
+              <a:spcAft>
+                <a:spcPts val="0"/>
+              </a:spcAft>
+              <a:buClrTx/>
+              <a:buSzTx/>
+              <a:buFontTx/>
+              <a:buNone/>
+              <a:tabLst/>
+              <a:defRPr/>
+            </a:pPr>
+            <a:endParaRPr kumimoji="0" lang="nl-NL" sz="1800" b="0" i="0" u="none" strike="noStrike" kern="0" cap="none" spc="0" normalizeH="0" baseline="0" noProof="0" smtClean="0">
+              <a:ln>
+                <a:noFill/>
+              </a:ln>
+              <a:solidFill>
+                <a:prstClr val="white"/>
+              </a:solidFill>
+              <a:effectLst/>
+              <a:uLnTx/>
+              <a:uFillTx/>
+              <a:latin typeface="Calibri" panose="020F0502020204030204"/>
+              <a:ea typeface="+mn-ea"/>
+              <a:cs typeface="+mn-cs"/>
+            </a:endParaRPr>
+          </a:p>
+        </p:txBody>
+      </p:sp>
+      <p:pic>
+        <p:nvPicPr>
+          <p:cNvPr id="41" name="Picture 40"/>
+          <p:cNvPicPr>
+            <a:picLocks noChangeAspect="1"/>
+          </p:cNvPicPr>
+          <p:nvPr/>
+        </p:nvPicPr>
+        <p:blipFill>
+          <a:blip r:embed="rId2">
+            <a:extLst>
+              <a:ext uri="{28A0092B-C50C-407E-A947-70E740481C1C}">
+                <a14:useLocalDpi xmlns:a14="http://schemas.microsoft.com/office/drawing/2010/main" val="0"/>
+              </a:ext>
+            </a:extLst>
+          </a:blip>
+          <a:stretch>
+            <a:fillRect/>
+          </a:stretch>
+        </p:blipFill>
+        <p:spPr>
+          <a:xfrm>
+            <a:off x="284658" y="2821016"/>
+            <a:ext cx="2606184" cy="1744190"/>
+          </a:xfrm>
+          <a:prstGeom prst="rect">
+            <a:avLst/>
+          </a:prstGeom>
+          <a:ln w="19050">
+            <a:solidFill>
+              <a:srgbClr val="5B9BD5">
+                <a:shade val="50000"/>
+              </a:srgbClr>
+            </a:solidFill>
+          </a:ln>
+        </p:spPr>
+      </p:pic>
+      <p:sp>
+        <p:nvSpPr>
+          <p:cNvPr id="42" name="Rectangle 41"/>
+          <p:cNvSpPr/>
+          <p:nvPr/>
+        </p:nvSpPr>
+        <p:spPr>
+          <a:xfrm>
+            <a:off x="4189119" y="2305455"/>
+            <a:ext cx="2042809" cy="2752928"/>
+          </a:xfrm>
+          <a:prstGeom prst="rect">
+            <a:avLst/>
+          </a:prstGeom>
+          <a:solidFill>
+            <a:srgbClr val="70AD47">
+              <a:lumMod val="75000"/>
+            </a:srgbClr>
+          </a:solidFill>
+          <a:ln w="12700" cap="flat" cmpd="sng" algn="ctr">
+            <a:solidFill>
+              <a:srgbClr val="5B9BD5">
+                <a:shade val="50000"/>
+              </a:srgbClr>
+            </a:solidFill>
+            <a:prstDash val="solid"/>
+            <a:miter lim="800000"/>
+          </a:ln>
+          <a:effectLst/>
+        </p:spPr>
+        <p:txBody>
+          <a:bodyPr rtlCol="0" anchor="ctr"/>
+          <a:lstStyle/>
+          <a:p>
+            <a:pPr marL="0" marR="0" lvl="0" indent="0" algn="ctr" defTabSz="914400" eaLnBrk="1" fontAlgn="auto" latinLnBrk="0" hangingPunct="1">
+              <a:lnSpc>
+                <a:spcPct val="100000"/>
+              </a:lnSpc>
+              <a:spcBef>
+                <a:spcPts val="0"/>
+              </a:spcBef>
+              <a:spcAft>
+                <a:spcPts val="0"/>
+              </a:spcAft>
+              <a:buClrTx/>
+              <a:buSzTx/>
+              <a:buFontTx/>
+              <a:buNone/>
+              <a:tabLst/>
+              <a:defRPr/>
+            </a:pPr>
+            <a:r>
+              <a:rPr kumimoji="0" lang="nl-NL" sz="1800" b="0" i="0" u="none" strike="noStrike" kern="0" cap="none" spc="0" normalizeH="0" baseline="0" noProof="0" dirty="0" smtClean="0">
+                <a:ln>
+                  <a:noFill/>
+                </a:ln>
+                <a:solidFill>
+                  <a:prstClr val="white"/>
+                </a:solidFill>
+                <a:effectLst/>
+                <a:uLnTx/>
+                <a:uFillTx/>
+                <a:latin typeface="Calibri" panose="020F0502020204030204"/>
+                <a:ea typeface="+mn-ea"/>
+                <a:cs typeface="+mn-cs"/>
+              </a:rPr>
+              <a:t>:80	NGINX</a:t>
+            </a:r>
+          </a:p>
+        </p:txBody>
+      </p:sp>
+      <p:cxnSp>
+        <p:nvCxnSpPr>
+          <p:cNvPr id="43" name="Straight Arrow Connector 42"/>
+          <p:cNvCxnSpPr>
+            <a:stCxn id="41" idx="3"/>
+            <a:endCxn id="42" idx="1"/>
+          </p:cNvCxnSpPr>
+          <p:nvPr/>
+        </p:nvCxnSpPr>
+        <p:spPr>
+          <a:xfrm flipV="1">
+            <a:off x="2890842" y="3681919"/>
+            <a:ext cx="1298277" cy="11192"/>
+          </a:xfrm>
+          <a:prstGeom prst="straightConnector1">
+            <a:avLst/>
+          </a:prstGeom>
+          <a:noFill/>
+          <a:ln w="31750" cap="flat" cmpd="sng" algn="ctr">
+            <a:solidFill>
+              <a:sysClr val="windowText" lastClr="000000"/>
+            </a:solidFill>
+            <a:prstDash val="solid"/>
+            <a:miter lim="800000"/>
+            <a:tailEnd type="triangle"/>
+          </a:ln>
+          <a:effectLst/>
+        </p:spPr>
+      </p:cxnSp>
+      <p:sp>
+        <p:nvSpPr>
+          <p:cNvPr id="44" name="TextBox 43"/>
+          <p:cNvSpPr txBox="1"/>
+          <p:nvPr/>
+        </p:nvSpPr>
+        <p:spPr>
+          <a:xfrm>
+            <a:off x="3453173" y="3759826"/>
+            <a:ext cx="715260" cy="369332"/>
+          </a:xfrm>
+          <a:prstGeom prst="rect">
+            <a:avLst/>
+          </a:prstGeom>
+          <a:noFill/>
+        </p:spPr>
+        <p:txBody>
+          <a:bodyPr wrap="none" rtlCol="0">
+            <a:spAutoFit/>
+          </a:bodyPr>
+          <a:lstStyle/>
+          <a:p>
+            <a:pPr marL="0" marR="0" lvl="0" indent="0" defTabSz="914400" eaLnBrk="1" fontAlgn="auto" latinLnBrk="0" hangingPunct="1">
+              <a:lnSpc>
+                <a:spcPct val="100000"/>
+              </a:lnSpc>
+              <a:spcBef>
+                <a:spcPts val="0"/>
+              </a:spcBef>
+              <a:spcAft>
+                <a:spcPts val="0"/>
+              </a:spcAft>
+              <a:buClrTx/>
+              <a:buSzTx/>
+              <a:buFontTx/>
+              <a:buNone/>
+              <a:tabLst/>
+              <a:defRPr/>
+            </a:pPr>
+            <a:r>
+              <a:rPr kumimoji="0" lang="nl-NL" sz="1800" b="0" i="0" u="none" strike="noStrike" kern="0" cap="none" spc="0" normalizeH="0" baseline="0" noProof="0" dirty="0" smtClean="0">
+                <a:ln>
+                  <a:noFill/>
+                </a:ln>
+                <a:solidFill>
+                  <a:prstClr val="black"/>
+                </a:solidFill>
+                <a:effectLst/>
+                <a:uLnTx/>
+                <a:uFillTx/>
+              </a:rPr>
+              <a:t>:4200</a:t>
+            </a:r>
+          </a:p>
+        </p:txBody>
+      </p:sp>
+      <p:sp>
+        <p:nvSpPr>
+          <p:cNvPr id="45" name="Rectangle 44"/>
+          <p:cNvSpPr/>
+          <p:nvPr/>
+        </p:nvSpPr>
+        <p:spPr>
+          <a:xfrm>
+            <a:off x="8848669" y="1121434"/>
+            <a:ext cx="2149812" cy="1449402"/>
+          </a:xfrm>
+          <a:prstGeom prst="rect">
+            <a:avLst/>
+          </a:prstGeom>
+          <a:solidFill>
+            <a:srgbClr val="70AD47">
+              <a:lumMod val="75000"/>
+            </a:srgbClr>
+          </a:solidFill>
+          <a:ln w="12700" cap="flat" cmpd="sng" algn="ctr">
+            <a:solidFill>
+              <a:srgbClr val="5B9BD5">
+                <a:shade val="50000"/>
+              </a:srgbClr>
+            </a:solidFill>
+            <a:prstDash val="solid"/>
+            <a:miter lim="800000"/>
+          </a:ln>
+          <a:effectLst/>
+        </p:spPr>
+        <p:txBody>
+          <a:bodyPr rtlCol="0" anchor="ctr"/>
+          <a:lstStyle/>
+          <a:p>
+            <a:pPr marL="0" marR="0" lvl="0" indent="0" algn="ctr" defTabSz="914400" eaLnBrk="1" fontAlgn="auto" latinLnBrk="0" hangingPunct="1">
+              <a:lnSpc>
+                <a:spcPct val="100000"/>
+              </a:lnSpc>
+              <a:spcBef>
+                <a:spcPts val="0"/>
+              </a:spcBef>
+              <a:spcAft>
+                <a:spcPts val="0"/>
+              </a:spcAft>
+              <a:buClrTx/>
+              <a:buSzTx/>
+              <a:buFontTx/>
+              <a:buNone/>
+              <a:tabLst/>
+              <a:defRPr/>
+            </a:pPr>
+            <a:r>
+              <a:rPr kumimoji="0" lang="nl-NL" sz="1800" b="0" i="0" u="none" strike="noStrike" kern="0" cap="none" spc="0" normalizeH="0" baseline="0" noProof="0" dirty="0" smtClean="0">
+                <a:ln>
+                  <a:noFill/>
+                </a:ln>
+                <a:solidFill>
+                  <a:prstClr val="white"/>
+                </a:solidFill>
+                <a:effectLst/>
+                <a:uLnTx/>
+                <a:uFillTx/>
+                <a:latin typeface="Calibri" panose="020F0502020204030204"/>
+                <a:ea typeface="+mn-ea"/>
+                <a:cs typeface="+mn-cs"/>
+              </a:rPr>
+              <a:t>:4201	SERVERJS</a:t>
+            </a:r>
+          </a:p>
+        </p:txBody>
+      </p:sp>
+      <p:cxnSp>
+        <p:nvCxnSpPr>
+          <p:cNvPr id="46" name="Straight Arrow Connector 45"/>
+          <p:cNvCxnSpPr>
+            <a:stCxn id="42" idx="3"/>
+            <a:endCxn id="45" idx="1"/>
+          </p:cNvCxnSpPr>
+          <p:nvPr/>
+        </p:nvCxnSpPr>
+        <p:spPr>
+          <a:xfrm flipV="1">
+            <a:off x="6231928" y="1846135"/>
+            <a:ext cx="2616741" cy="1835784"/>
+          </a:xfrm>
+          <a:prstGeom prst="straightConnector1">
+            <a:avLst/>
+          </a:prstGeom>
+          <a:noFill/>
+          <a:ln w="31750" cap="flat" cmpd="sng" algn="ctr">
+            <a:solidFill>
+              <a:sysClr val="windowText" lastClr="000000"/>
+            </a:solidFill>
+            <a:prstDash val="solid"/>
+            <a:miter lim="800000"/>
+            <a:tailEnd type="triangle"/>
+          </a:ln>
+          <a:effectLst/>
+        </p:spPr>
+      </p:cxnSp>
+      <p:sp>
+        <p:nvSpPr>
+          <p:cNvPr id="47" name="TextBox 46"/>
+          <p:cNvSpPr txBox="1"/>
+          <p:nvPr/>
+        </p:nvSpPr>
+        <p:spPr>
+          <a:xfrm>
+            <a:off x="6951774" y="1468260"/>
+            <a:ext cx="1312795" cy="369332"/>
+          </a:xfrm>
+          <a:prstGeom prst="rect">
+            <a:avLst/>
+          </a:prstGeom>
+          <a:noFill/>
+        </p:spPr>
+        <p:txBody>
+          <a:bodyPr wrap="none" rtlCol="0">
+            <a:spAutoFit/>
+          </a:bodyPr>
+          <a:lstStyle/>
+          <a:p>
+            <a:pPr marL="0" marR="0" lvl="0" indent="0" defTabSz="914400" eaLnBrk="1" fontAlgn="auto" latinLnBrk="0" hangingPunct="1">
+              <a:lnSpc>
+                <a:spcPct val="100000"/>
+              </a:lnSpc>
+              <a:spcBef>
+                <a:spcPts val="0"/>
+              </a:spcBef>
+              <a:spcAft>
+                <a:spcPts val="0"/>
+              </a:spcAft>
+              <a:buClrTx/>
+              <a:buSzTx/>
+              <a:buFontTx/>
+              <a:buNone/>
+              <a:tabLst/>
+              <a:defRPr/>
+            </a:pPr>
+            <a:r>
+              <a:rPr kumimoji="0" lang="nl-NL" sz="1800" b="0" i="0" u="none" strike="noStrike" kern="0" cap="none" spc="0" normalizeH="0" baseline="0" noProof="0" dirty="0" smtClean="0">
+                <a:ln>
+                  <a:noFill/>
+                </a:ln>
+                <a:solidFill>
+                  <a:prstClr val="black"/>
+                </a:solidFill>
+                <a:effectLst/>
+                <a:uLnTx/>
+                <a:uFillTx/>
+              </a:rPr>
+              <a:t>/</a:t>
+            </a:r>
+            <a:r>
+              <a:rPr kumimoji="0" lang="nl-NL" sz="1800" b="0" i="0" u="none" strike="noStrike" kern="0" cap="none" spc="0" normalizeH="0" baseline="0" noProof="0" dirty="0" err="1" smtClean="0">
+                <a:ln>
+                  <a:noFill/>
+                </a:ln>
+                <a:solidFill>
+                  <a:prstClr val="black"/>
+                </a:solidFill>
+                <a:effectLst/>
+                <a:uLnTx/>
+                <a:uFillTx/>
+              </a:rPr>
+              <a:t>api</a:t>
+            </a:r>
+            <a:r>
+              <a:rPr kumimoji="0" lang="nl-NL" sz="1800" b="0" i="0" u="none" strike="noStrike" kern="0" cap="none" spc="0" normalizeH="0" baseline="0" noProof="0" dirty="0" smtClean="0">
+                <a:ln>
+                  <a:noFill/>
+                </a:ln>
+                <a:solidFill>
+                  <a:prstClr val="black"/>
+                </a:solidFill>
+                <a:effectLst/>
+                <a:uLnTx/>
+                <a:uFillTx/>
+              </a:rPr>
+              <a:t>/</a:t>
+            </a:r>
+            <a:r>
+              <a:rPr kumimoji="0" lang="nl-NL" sz="1800" b="0" i="0" u="none" strike="noStrike" kern="0" cap="none" spc="0" normalizeH="0" baseline="0" noProof="0" dirty="0" err="1" smtClean="0">
+                <a:ln>
+                  <a:noFill/>
+                </a:ln>
+                <a:solidFill>
+                  <a:prstClr val="black"/>
+                </a:solidFill>
+                <a:effectLst/>
+                <a:uLnTx/>
+                <a:uFillTx/>
+              </a:rPr>
+              <a:t>movies</a:t>
+            </a:r>
+            <a:endParaRPr kumimoji="0" lang="nl-NL" sz="1800" b="0" i="0" u="none" strike="noStrike" kern="0" cap="none" spc="0" normalizeH="0" baseline="0" noProof="0" dirty="0" smtClean="0">
+              <a:ln>
+                <a:noFill/>
+              </a:ln>
+              <a:solidFill>
+                <a:prstClr val="black"/>
+              </a:solidFill>
+              <a:effectLst/>
+              <a:uLnTx/>
+              <a:uFillTx/>
+            </a:endParaRPr>
+          </a:p>
+        </p:txBody>
+      </p:sp>
+      <p:sp>
+        <p:nvSpPr>
+          <p:cNvPr id="48" name="TextBox 47"/>
+          <p:cNvSpPr txBox="1"/>
+          <p:nvPr/>
+        </p:nvSpPr>
+        <p:spPr>
+          <a:xfrm>
+            <a:off x="8180103" y="1512939"/>
+            <a:ext cx="715260" cy="369332"/>
+          </a:xfrm>
+          <a:prstGeom prst="rect">
+            <a:avLst/>
+          </a:prstGeom>
+          <a:noFill/>
+        </p:spPr>
+        <p:txBody>
+          <a:bodyPr wrap="none" rtlCol="0">
+            <a:spAutoFit/>
+          </a:bodyPr>
+          <a:lstStyle/>
+          <a:p>
+            <a:pPr marL="0" marR="0" lvl="0" indent="0" defTabSz="914400" eaLnBrk="1" fontAlgn="auto" latinLnBrk="0" hangingPunct="1">
+              <a:lnSpc>
+                <a:spcPct val="100000"/>
+              </a:lnSpc>
+              <a:spcBef>
+                <a:spcPts val="0"/>
+              </a:spcBef>
+              <a:spcAft>
+                <a:spcPts val="0"/>
+              </a:spcAft>
+              <a:buClrTx/>
+              <a:buSzTx/>
+              <a:buFontTx/>
+              <a:buNone/>
+              <a:tabLst/>
+              <a:defRPr/>
+            </a:pPr>
+            <a:r>
+              <a:rPr kumimoji="0" lang="nl-NL" sz="1800" b="0" i="0" u="none" strike="noStrike" kern="0" cap="none" spc="0" normalizeH="0" baseline="0" noProof="0" dirty="0" smtClean="0">
+                <a:ln>
+                  <a:noFill/>
+                </a:ln>
+                <a:solidFill>
+                  <a:prstClr val="black"/>
+                </a:solidFill>
+                <a:effectLst/>
+                <a:uLnTx/>
+                <a:uFillTx/>
+              </a:rPr>
+              <a:t>:8090</a:t>
+            </a:r>
+          </a:p>
+        </p:txBody>
+      </p:sp>
+      <p:sp>
+        <p:nvSpPr>
+          <p:cNvPr id="49" name="TextBox 48"/>
+          <p:cNvSpPr txBox="1"/>
+          <p:nvPr/>
+        </p:nvSpPr>
+        <p:spPr>
+          <a:xfrm>
+            <a:off x="5777575" y="1813405"/>
+            <a:ext cx="584968" cy="369332"/>
+          </a:xfrm>
+          <a:prstGeom prst="rect">
+            <a:avLst/>
+          </a:prstGeom>
+          <a:noFill/>
+        </p:spPr>
+        <p:txBody>
+          <a:bodyPr wrap="none" rtlCol="0">
+            <a:spAutoFit/>
+          </a:bodyPr>
+          <a:lstStyle/>
+          <a:p>
+            <a:pPr marL="0" marR="0" lvl="0" indent="0" defTabSz="914400" eaLnBrk="1" fontAlgn="auto" latinLnBrk="0" hangingPunct="1">
+              <a:lnSpc>
+                <a:spcPct val="100000"/>
+              </a:lnSpc>
+              <a:spcBef>
+                <a:spcPts val="0"/>
+              </a:spcBef>
+              <a:spcAft>
+                <a:spcPts val="0"/>
+              </a:spcAft>
+              <a:buClrTx/>
+              <a:buSzTx/>
+              <a:buFontTx/>
+              <a:buNone/>
+              <a:tabLst/>
+              <a:defRPr/>
+            </a:pPr>
+            <a:r>
+              <a:rPr kumimoji="0" lang="nl-NL" sz="1800" b="0" i="0" u="none" strike="noStrike" kern="0" cap="none" spc="0" normalizeH="0" baseline="0" noProof="0" dirty="0" smtClean="0">
+                <a:ln>
+                  <a:noFill/>
+                </a:ln>
+                <a:solidFill>
+                  <a:prstClr val="black"/>
+                </a:solidFill>
+                <a:effectLst/>
+                <a:uLnTx/>
+                <a:uFillTx/>
+              </a:rPr>
+              <a:t>web</a:t>
+            </a:r>
+          </a:p>
+        </p:txBody>
+      </p:sp>
+      <p:sp>
+        <p:nvSpPr>
+          <p:cNvPr id="50" name="TextBox 49"/>
+          <p:cNvSpPr txBox="1"/>
+          <p:nvPr/>
+        </p:nvSpPr>
+        <p:spPr>
+          <a:xfrm>
+            <a:off x="9688575" y="748753"/>
+            <a:ext cx="470000" cy="369332"/>
+          </a:xfrm>
+          <a:prstGeom prst="rect">
+            <a:avLst/>
+          </a:prstGeom>
+          <a:noFill/>
+        </p:spPr>
+        <p:txBody>
+          <a:bodyPr wrap="none" rtlCol="0">
+            <a:spAutoFit/>
+          </a:bodyPr>
+          <a:lstStyle/>
+          <a:p>
+            <a:pPr marL="0" marR="0" lvl="0" indent="0" defTabSz="914400" eaLnBrk="1" fontAlgn="auto" latinLnBrk="0" hangingPunct="1">
+              <a:lnSpc>
+                <a:spcPct val="100000"/>
+              </a:lnSpc>
+              <a:spcBef>
+                <a:spcPts val="0"/>
+              </a:spcBef>
+              <a:spcAft>
+                <a:spcPts val="0"/>
+              </a:spcAft>
+              <a:buClrTx/>
+              <a:buSzTx/>
+              <a:buFontTx/>
+              <a:buNone/>
+              <a:tabLst/>
+              <a:defRPr/>
+            </a:pPr>
+            <a:r>
+              <a:rPr kumimoji="0" lang="nl-NL" sz="1800" b="0" i="0" u="none" strike="noStrike" kern="0" cap="none" spc="0" normalizeH="0" baseline="0" noProof="0" dirty="0" err="1" smtClean="0">
+                <a:ln>
+                  <a:noFill/>
+                </a:ln>
+                <a:solidFill>
+                  <a:prstClr val="black"/>
+                </a:solidFill>
+                <a:effectLst/>
+                <a:uLnTx/>
+                <a:uFillTx/>
+              </a:rPr>
+              <a:t>api</a:t>
+            </a:r>
+            <a:endParaRPr kumimoji="0" lang="nl-NL" sz="1800" b="0" i="0" u="none" strike="noStrike" kern="0" cap="none" spc="0" normalizeH="0" baseline="0" noProof="0" dirty="0" smtClean="0">
+              <a:ln>
+                <a:noFill/>
+              </a:ln>
+              <a:solidFill>
+                <a:prstClr val="black"/>
+              </a:solidFill>
+              <a:effectLst/>
+              <a:uLnTx/>
+              <a:uFillTx/>
+            </a:endParaRPr>
+          </a:p>
+        </p:txBody>
+      </p:sp>
+      <p:sp>
+        <p:nvSpPr>
+          <p:cNvPr id="51" name="Rectangle 50"/>
+          <p:cNvSpPr/>
+          <p:nvPr/>
+        </p:nvSpPr>
+        <p:spPr>
+          <a:xfrm>
+            <a:off x="8919686" y="3381074"/>
+            <a:ext cx="2976139" cy="1794775"/>
+          </a:xfrm>
+          <a:prstGeom prst="rect">
+            <a:avLst/>
+          </a:prstGeom>
+          <a:solidFill>
+            <a:srgbClr val="5B9BD5"/>
+          </a:solidFill>
+          <a:ln w="12700" cap="flat" cmpd="sng" algn="ctr">
+            <a:solidFill>
+              <a:srgbClr val="5B9BD5">
+                <a:shade val="50000"/>
+              </a:srgbClr>
+            </a:solidFill>
+            <a:prstDash val="solid"/>
+            <a:miter lim="800000"/>
+          </a:ln>
+          <a:effectLst/>
+        </p:spPr>
+        <p:txBody>
+          <a:bodyPr rtlCol="0" anchor="ctr"/>
+          <a:lstStyle/>
+          <a:p>
+            <a:pPr marL="0" marR="0" lvl="0" indent="0" algn="ctr" defTabSz="914400" eaLnBrk="1" fontAlgn="auto" latinLnBrk="0" hangingPunct="1">
+              <a:lnSpc>
+                <a:spcPct val="100000"/>
+              </a:lnSpc>
+              <a:spcBef>
+                <a:spcPts val="0"/>
+              </a:spcBef>
+              <a:spcAft>
+                <a:spcPts val="0"/>
+              </a:spcAft>
+              <a:buClrTx/>
+              <a:buSzTx/>
+              <a:buFontTx/>
+              <a:buNone/>
+              <a:tabLst/>
+              <a:defRPr/>
+            </a:pPr>
+            <a:r>
+              <a:rPr kumimoji="0" lang="nl-NL" sz="1800" b="0" i="0" u="none" strike="noStrike" kern="0" cap="none" spc="0" normalizeH="0" baseline="0" noProof="0" dirty="0" smtClean="0">
+                <a:ln>
+                  <a:noFill/>
+                </a:ln>
+                <a:solidFill>
+                  <a:prstClr val="white"/>
+                </a:solidFill>
+                <a:effectLst/>
+                <a:uLnTx/>
+                <a:uFillTx/>
+                <a:latin typeface="Calibri" panose="020F0502020204030204"/>
+                <a:ea typeface="+mn-ea"/>
+                <a:cs typeface="+mn-cs"/>
+              </a:rPr>
+              <a:t>:4201	</a:t>
+            </a:r>
+            <a:r>
+              <a:rPr kumimoji="0" lang="nl-NL" sz="1800" b="0" i="0" u="none" strike="noStrike" kern="0" cap="none" spc="0" normalizeH="0" baseline="0" noProof="0" dirty="0" err="1" smtClean="0">
+                <a:ln>
+                  <a:noFill/>
+                </a:ln>
+                <a:solidFill>
+                  <a:prstClr val="white"/>
+                </a:solidFill>
+                <a:effectLst/>
+                <a:uLnTx/>
+                <a:uFillTx/>
+                <a:latin typeface="Calibri" panose="020F0502020204030204"/>
+                <a:ea typeface="+mn-ea"/>
+                <a:cs typeface="+mn-cs"/>
+              </a:rPr>
+              <a:t>ASP.Net</a:t>
+            </a:r>
+            <a:r>
+              <a:rPr kumimoji="0" lang="nl-NL" sz="1800" b="0" i="0" u="none" strike="noStrike" kern="0" cap="none" spc="0" normalizeH="0" baseline="0" noProof="0" dirty="0" smtClean="0">
+                <a:ln>
+                  <a:noFill/>
+                </a:ln>
+                <a:solidFill>
+                  <a:prstClr val="white"/>
+                </a:solidFill>
+                <a:effectLst/>
+                <a:uLnTx/>
+                <a:uFillTx/>
+                <a:latin typeface="Calibri" panose="020F0502020204030204"/>
+                <a:ea typeface="+mn-ea"/>
+                <a:cs typeface="+mn-cs"/>
+              </a:rPr>
+              <a:t> </a:t>
+            </a:r>
+            <a:r>
+              <a:rPr kumimoji="0" lang="nl-NL" sz="1800" b="0" i="0" u="none" strike="noStrike" kern="0" cap="none" spc="0" normalizeH="0" baseline="0" noProof="0" dirty="0" err="1" smtClean="0">
+                <a:ln>
+                  <a:noFill/>
+                </a:ln>
+                <a:solidFill>
+                  <a:prstClr val="white"/>
+                </a:solidFill>
+                <a:effectLst/>
+                <a:uLnTx/>
+                <a:uFillTx/>
+                <a:latin typeface="Calibri" panose="020F0502020204030204"/>
+                <a:ea typeface="+mn-ea"/>
+                <a:cs typeface="+mn-cs"/>
+              </a:rPr>
+              <a:t>Core</a:t>
+            </a:r>
+            <a:r>
+              <a:rPr kumimoji="0" lang="nl-NL" sz="1800" b="0" i="0" u="none" strike="noStrike" kern="0" cap="none" spc="0" normalizeH="0" baseline="0" noProof="0" dirty="0" smtClean="0">
+                <a:ln>
+                  <a:noFill/>
+                </a:ln>
+                <a:solidFill>
+                  <a:prstClr val="white"/>
+                </a:solidFill>
+                <a:effectLst/>
+                <a:uLnTx/>
+                <a:uFillTx/>
+                <a:latin typeface="Calibri" panose="020F0502020204030204"/>
+                <a:ea typeface="+mn-ea"/>
+                <a:cs typeface="+mn-cs"/>
+              </a:rPr>
+              <a:t> MVC</a:t>
+            </a:r>
+          </a:p>
+        </p:txBody>
+      </p:sp>
+      <p:sp>
+        <p:nvSpPr>
+          <p:cNvPr id="52" name="TextBox 51"/>
+          <p:cNvSpPr txBox="1"/>
+          <p:nvPr/>
+        </p:nvSpPr>
+        <p:spPr>
+          <a:xfrm>
+            <a:off x="5537354" y="4380540"/>
+            <a:ext cx="715260" cy="369332"/>
+          </a:xfrm>
+          <a:prstGeom prst="rect">
+            <a:avLst/>
+          </a:prstGeom>
+          <a:noFill/>
+        </p:spPr>
+        <p:txBody>
+          <a:bodyPr wrap="none" rtlCol="0">
+            <a:spAutoFit/>
+          </a:bodyPr>
+          <a:lstStyle/>
+          <a:p>
+            <a:pPr marL="0" marR="0" lvl="0" indent="0" defTabSz="914400" eaLnBrk="1" fontAlgn="auto" latinLnBrk="0" hangingPunct="1">
+              <a:lnSpc>
+                <a:spcPct val="100000"/>
+              </a:lnSpc>
+              <a:spcBef>
+                <a:spcPts val="0"/>
+              </a:spcBef>
+              <a:spcAft>
+                <a:spcPts val="0"/>
+              </a:spcAft>
+              <a:buClrTx/>
+              <a:buSzTx/>
+              <a:buFontTx/>
+              <a:buNone/>
+              <a:tabLst/>
+              <a:defRPr/>
+            </a:pPr>
+            <a:r>
+              <a:rPr kumimoji="0" lang="nl-NL" sz="1800" b="0" i="0" u="none" strike="noStrike" kern="0" cap="none" spc="0" normalizeH="0" baseline="0" noProof="0" dirty="0" smtClean="0">
+                <a:ln>
+                  <a:noFill/>
+                </a:ln>
+                <a:solidFill>
+                  <a:prstClr val="black"/>
+                </a:solidFill>
+                <a:effectLst/>
+                <a:uLnTx/>
+                <a:uFillTx/>
+              </a:rPr>
+              <a:t>:8200</a:t>
+            </a:r>
+          </a:p>
+        </p:txBody>
+      </p:sp>
+      <p:sp>
+        <p:nvSpPr>
+          <p:cNvPr id="53" name="TextBox 52"/>
+          <p:cNvSpPr txBox="1"/>
+          <p:nvPr/>
+        </p:nvSpPr>
+        <p:spPr>
+          <a:xfrm>
+            <a:off x="8152671" y="4266289"/>
+            <a:ext cx="715260" cy="369332"/>
+          </a:xfrm>
+          <a:prstGeom prst="rect">
+            <a:avLst/>
+          </a:prstGeom>
+          <a:noFill/>
+        </p:spPr>
+        <p:txBody>
+          <a:bodyPr wrap="none" rtlCol="0">
+            <a:spAutoFit/>
+          </a:bodyPr>
+          <a:lstStyle/>
+          <a:p>
+            <a:pPr marL="0" marR="0" lvl="0" indent="0" defTabSz="914400" eaLnBrk="1" fontAlgn="auto" latinLnBrk="0" hangingPunct="1">
+              <a:lnSpc>
+                <a:spcPct val="100000"/>
+              </a:lnSpc>
+              <a:spcBef>
+                <a:spcPts val="0"/>
+              </a:spcBef>
+              <a:spcAft>
+                <a:spcPts val="0"/>
+              </a:spcAft>
+              <a:buClrTx/>
+              <a:buSzTx/>
+              <a:buFontTx/>
+              <a:buNone/>
+              <a:tabLst/>
+              <a:defRPr/>
+            </a:pPr>
+            <a:r>
+              <a:rPr kumimoji="0" lang="nl-NL" sz="1800" b="0" i="0" u="none" strike="noStrike" kern="0" cap="none" spc="0" normalizeH="0" baseline="0" noProof="0" dirty="0" smtClean="0">
+                <a:ln>
+                  <a:noFill/>
+                </a:ln>
+                <a:solidFill>
+                  <a:prstClr val="black"/>
+                </a:solidFill>
+                <a:effectLst/>
+                <a:uLnTx/>
+                <a:uFillTx/>
+              </a:rPr>
+              <a:t>:5200</a:t>
+            </a:r>
+          </a:p>
+        </p:txBody>
+      </p:sp>
+      <p:sp>
+        <p:nvSpPr>
+          <p:cNvPr id="54" name="TextBox 53"/>
+          <p:cNvSpPr txBox="1"/>
+          <p:nvPr/>
+        </p:nvSpPr>
+        <p:spPr>
+          <a:xfrm>
+            <a:off x="9661143" y="3024200"/>
+            <a:ext cx="564322" cy="369332"/>
+          </a:xfrm>
+          <a:prstGeom prst="rect">
+            <a:avLst/>
+          </a:prstGeom>
+          <a:noFill/>
+        </p:spPr>
+        <p:txBody>
+          <a:bodyPr wrap="none" rtlCol="0">
+            <a:spAutoFit/>
+          </a:bodyPr>
+          <a:lstStyle/>
+          <a:p>
+            <a:pPr marL="0" marR="0" lvl="0" indent="0" defTabSz="914400" eaLnBrk="1" fontAlgn="auto" latinLnBrk="0" hangingPunct="1">
+              <a:lnSpc>
+                <a:spcPct val="100000"/>
+              </a:lnSpc>
+              <a:spcBef>
+                <a:spcPts val="0"/>
+              </a:spcBef>
+              <a:spcAft>
+                <a:spcPts val="0"/>
+              </a:spcAft>
+              <a:buClrTx/>
+              <a:buSzTx/>
+              <a:buFontTx/>
+              <a:buNone/>
+              <a:tabLst/>
+              <a:defRPr/>
+            </a:pPr>
+            <a:r>
+              <a:rPr kumimoji="0" lang="nl-NL" sz="1800" b="0" i="0" u="none" strike="noStrike" kern="0" cap="none" spc="0" normalizeH="0" baseline="0" noProof="0" dirty="0" err="1" smtClean="0">
+                <a:ln>
+                  <a:noFill/>
+                </a:ln>
+                <a:solidFill>
+                  <a:prstClr val="black"/>
+                </a:solidFill>
+                <a:effectLst/>
+                <a:uLnTx/>
+                <a:uFillTx/>
+              </a:rPr>
+              <a:t>mvc</a:t>
+            </a:r>
+            <a:endParaRPr kumimoji="0" lang="nl-NL" sz="1800" b="0" i="0" u="none" strike="noStrike" kern="0" cap="none" spc="0" normalizeH="0" baseline="0" noProof="0" dirty="0" smtClean="0">
+              <a:ln>
+                <a:noFill/>
+              </a:ln>
+              <a:solidFill>
+                <a:prstClr val="black"/>
+              </a:solidFill>
+              <a:effectLst/>
+              <a:uLnTx/>
+              <a:uFillTx/>
+            </a:endParaRPr>
+          </a:p>
+        </p:txBody>
+      </p:sp>
+      <p:cxnSp>
+        <p:nvCxnSpPr>
+          <p:cNvPr id="55" name="Straight Arrow Connector 54"/>
+          <p:cNvCxnSpPr>
+            <a:endCxn id="51" idx="1"/>
+          </p:cNvCxnSpPr>
+          <p:nvPr/>
+        </p:nvCxnSpPr>
+        <p:spPr>
+          <a:xfrm>
+            <a:off x="6344215" y="3910007"/>
+            <a:ext cx="2575471" cy="368455"/>
+          </a:xfrm>
+          <a:prstGeom prst="straightConnector1">
+            <a:avLst/>
+          </a:prstGeom>
+          <a:noFill/>
+          <a:ln w="31750" cap="flat" cmpd="sng" algn="ctr">
+            <a:solidFill>
+              <a:sysClr val="windowText" lastClr="000000"/>
+            </a:solidFill>
+            <a:prstDash val="solid"/>
+            <a:miter lim="800000"/>
+            <a:tailEnd type="triangle"/>
+          </a:ln>
+          <a:effectLst/>
+        </p:spPr>
+      </p:cxnSp>
+    </p:spTree>
+    <p:extLst>
+      <p:ext uri="{BB962C8B-B14F-4D97-AF65-F5344CB8AC3E}">
+        <p14:creationId xmlns:p14="http://schemas.microsoft.com/office/powerpoint/2010/main" val="3249548036"/>
       </p:ext>
     </p:extLst>
   </p:cSld>
@@ -5119,6 +7505,21 @@
 </file>
 
 <file path=customXml/item1.xml><?xml version="1.0" encoding="utf-8"?>
+<p:properties xmlns:p="http://schemas.microsoft.com/office/2006/metadata/properties" xmlns:xsi="http://www.w3.org/2001/XMLSchema-instance" xmlns:pc="http://schemas.microsoft.com/office/infopath/2007/PartnerControls">
+  <documentManagement/>
+</p:properties>
+</file>
+
+<file path=customXml/item2.xml><?xml version="1.0" encoding="utf-8"?>
+<?mso-contentType ?>
+<FormTemplates xmlns="http://schemas.microsoft.com/sharepoint/v3/contenttype/forms">
+  <Display>DocumentLibraryForm</Display>
+  <Edit>DocumentLibraryForm</Edit>
+  <New>DocumentLibraryForm</New>
+</FormTemplates>
+</file>
+
+<file path=customXml/item3.xml><?xml version="1.0" encoding="utf-8"?>
 <ct:contentTypeSchema xmlns:ct="http://schemas.microsoft.com/office/2006/metadata/contentType" xmlns:ma="http://schemas.microsoft.com/office/2006/metadata/properties/metaAttributes" ct:_="" ma:_="" ma:contentTypeName="Document" ma:contentTypeID="0x0101009843F10021B1B74BA5DD583B6999787F" ma:contentTypeVersion="1" ma:contentTypeDescription="Een nieuw document maken." ma:contentTypeScope="" ma:versionID="9fe8e6bb692149f7f6309adc5fa49803">
   <xsd:schema xmlns:xsd="http://www.w3.org/2001/XMLSchema" xmlns:xs="http://www.w3.org/2001/XMLSchema" xmlns:p="http://schemas.microsoft.com/office/2006/metadata/properties" targetNamespace="http://schemas.microsoft.com/office/2006/metadata/properties" ma:root="true" ma:fieldsID="eba296b9b19381bc8f01ad6905184223">
     <xsd:element name="properties">
@@ -5232,22 +7633,30 @@
 </ct:contentTypeSchema>
 </file>
 
-<file path=customXml/item2.xml><?xml version="1.0" encoding="utf-8"?>
-<?mso-contentType ?>
-<FormTemplates xmlns="http://schemas.microsoft.com/sharepoint/v3/contenttype/forms">
-  <Display>DocumentLibraryForm</Display>
-  <Edit>DocumentLibraryForm</Edit>
-  <New>DocumentLibraryForm</New>
-</FormTemplates>
+<file path=customXml/itemProps1.xml><?xml version="1.0" encoding="utf-8"?>
+<ds:datastoreItem xmlns:ds="http://schemas.openxmlformats.org/officeDocument/2006/customXml" ds:itemID="{DE0A3E1F-B2EC-4B36-9F71-3169FFDE4AE0}">
+  <ds:schemaRefs>
+    <ds:schemaRef ds:uri="http://schemas.openxmlformats.org/package/2006/metadata/core-properties"/>
+    <ds:schemaRef ds:uri="http://purl.org/dc/dcmitype/"/>
+    <ds:schemaRef ds:uri="http://schemas.microsoft.com/office/2006/documentManagement/types"/>
+    <ds:schemaRef ds:uri="http://purl.org/dc/elements/1.1/"/>
+    <ds:schemaRef ds:uri="http://schemas.microsoft.com/office/2006/metadata/properties"/>
+    <ds:schemaRef ds:uri="http://purl.org/dc/terms/"/>
+    <ds:schemaRef ds:uri="http://schemas.microsoft.com/office/infopath/2007/PartnerControls"/>
+    <ds:schemaRef ds:uri="http://www.w3.org/XML/1998/namespace"/>
+  </ds:schemaRefs>
+</ds:datastoreItem>
 </file>
 
-<file path=customXml/item3.xml><?xml version="1.0" encoding="utf-8"?>
-<p:properties xmlns:p="http://schemas.microsoft.com/office/2006/metadata/properties" xmlns:xsi="http://www.w3.org/2001/XMLSchema-instance" xmlns:pc="http://schemas.microsoft.com/office/infopath/2007/PartnerControls">
-  <documentManagement/>
-</p:properties>
+<file path=customXml/itemProps2.xml><?xml version="1.0" encoding="utf-8"?>
+<ds:datastoreItem xmlns:ds="http://schemas.openxmlformats.org/officeDocument/2006/customXml" ds:itemID="{4A752D92-0ACC-48D2-A658-AB744FE70ECE}">
+  <ds:schemaRefs>
+    <ds:schemaRef ds:uri="http://schemas.microsoft.com/sharepoint/v3/contenttype/forms"/>
+  </ds:schemaRefs>
+</ds:datastoreItem>
 </file>
 
-<file path=customXml/itemProps1.xml><?xml version="1.0" encoding="utf-8"?>
+<file path=customXml/itemProps3.xml><?xml version="1.0" encoding="utf-8"?>
 <ds:datastoreItem xmlns:ds="http://schemas.openxmlformats.org/officeDocument/2006/customXml" ds:itemID="{F6916CFB-C98C-4D26-B77C-F1E6DDC5B92D}">
   <ds:schemaRefs>
     <ds:schemaRef ds:uri="http://schemas.microsoft.com/office/2006/metadata/contentType"/>
@@ -5261,27 +7670,4 @@
     <ds:schemaRef ds:uri="http://schemas.microsoft.com/office/infopath/2007/PartnerControls"/>
   </ds:schemaRefs>
 </ds:datastoreItem>
-</file>
-
-<file path=customXml/itemProps2.xml><?xml version="1.0" encoding="utf-8"?>
-<ds:datastoreItem xmlns:ds="http://schemas.openxmlformats.org/officeDocument/2006/customXml" ds:itemID="{4A752D92-0ACC-48D2-A658-AB744FE70ECE}">
-  <ds:schemaRefs>
-    <ds:schemaRef ds:uri="http://schemas.microsoft.com/sharepoint/v3/contenttype/forms"/>
-  </ds:schemaRefs>
-</ds:datastoreItem>
-</file>
-
-<file path=customXml/itemProps3.xml><?xml version="1.0" encoding="utf-8"?>
-<ds:datastoreItem xmlns:ds="http://schemas.openxmlformats.org/officeDocument/2006/customXml" ds:itemID="{DE0A3E1F-B2EC-4B36-9F71-3169FFDE4AE0}">
-  <ds:schemaRefs>
-    <ds:schemaRef ds:uri="http://purl.org/dc/terms/"/>
-    <ds:schemaRef ds:uri="http://schemas.openxmlformats.org/package/2006/metadata/core-properties"/>
-    <ds:schemaRef ds:uri="http://schemas.microsoft.com/office/2006/documentManagement/types"/>
-    <ds:schemaRef ds:uri="http://schemas.microsoft.com/office/infopath/2007/PartnerControls"/>
-    <ds:schemaRef ds:uri="http://purl.org/dc/elements/1.1/"/>
-    <ds:schemaRef ds:uri="http://schemas.microsoft.com/office/2006/metadata/properties"/>
-    <ds:schemaRef ds:uri="http://www.w3.org/XML/1998/namespace"/>
-    <ds:schemaRef ds:uri="http://purl.org/dc/dcmitype/"/>
-  </ds:schemaRefs>
-</ds:datastoreItem>
 </file>
</xml_diff>